<commit_message>
organizing talks by year
git-svn-id: file:///localdisk/subversion/inca/trunk/pubs@12289 7dba3f4a-8be6-0310-8b3b-b4fec25ea7f3
</commit_message>
<xml_diff>
--- a/pubs/talks/inca_ucgrid_0409.pptx
+++ b/pubs/talks/inca_ucgrid_0409.pptx
@@ -5,26 +5,24 @@
     <p:sldMasterId id="2147483651" r:id="rId1"/>
   </p:sldMasterIdLst>
   <p:notesMasterIdLst>
-    <p:notesMasterId r:id="rId16"/>
+    <p:notesMasterId r:id="rId14"/>
   </p:notesMasterIdLst>
   <p:handoutMasterIdLst>
-    <p:handoutMasterId r:id="rId17"/>
+    <p:handoutMasterId r:id="rId15"/>
   </p:handoutMasterIdLst>
   <p:sldIdLst>
     <p:sldId id="334" r:id="rId2"/>
     <p:sldId id="358" r:id="rId3"/>
-    <p:sldId id="339" r:id="rId4"/>
-    <p:sldId id="261" r:id="rId5"/>
-    <p:sldId id="341" r:id="rId6"/>
-    <p:sldId id="356" r:id="rId7"/>
-    <p:sldId id="357" r:id="rId8"/>
-    <p:sldId id="360" r:id="rId9"/>
-    <p:sldId id="361" r:id="rId10"/>
-    <p:sldId id="359" r:id="rId11"/>
-    <p:sldId id="363" r:id="rId12"/>
-    <p:sldId id="364" r:id="rId13"/>
-    <p:sldId id="277" r:id="rId14"/>
-    <p:sldId id="362" r:id="rId15"/>
+    <p:sldId id="261" r:id="rId4"/>
+    <p:sldId id="341" r:id="rId5"/>
+    <p:sldId id="356" r:id="rId6"/>
+    <p:sldId id="357" r:id="rId7"/>
+    <p:sldId id="360" r:id="rId8"/>
+    <p:sldId id="361" r:id="rId9"/>
+    <p:sldId id="359" r:id="rId10"/>
+    <p:sldId id="363" r:id="rId11"/>
+    <p:sldId id="277" r:id="rId12"/>
+    <p:sldId id="362" r:id="rId13"/>
   </p:sldIdLst>
   <p:sldSz cx="9144000" cy="6858000" type="screen4x3"/>
   <p:notesSz cx="6858000" cy="9144000"/>
@@ -962,109 +960,6 @@
 </p:notes>
 </file>
 
-<file path=ppt/notesSlides/notesSlide10.xml><?xml version="1.0" encoding="utf-8"?>
-<p:notes xmlns:a="http://schemas.openxmlformats.org/drawingml/2006/main" xmlns:r="http://schemas.openxmlformats.org/officeDocument/2006/relationships" xmlns:mc="http://schemas.openxmlformats.org/markup-compatibility/2006" xmlns:mv="urn:schemas-microsoft-com:mac:vml" xmlns:p="http://schemas.openxmlformats.org/presentationml/2006/main" mc:Ignorable="mv" mc:PreserveAttributes="mv:*">
-  <p:cSld>
-    <p:spTree>
-      <p:nvGrpSpPr>
-        <p:cNvPr id="1" name=""/>
-        <p:cNvGrpSpPr/>
-        <p:nvPr/>
-      </p:nvGrpSpPr>
-      <p:grpSpPr>
-        <a:xfrm>
-          <a:off x="0" y="0"/>
-          <a:ext cx="0" cy="0"/>
-          <a:chOff x="0" y="0"/>
-          <a:chExt cx="0" cy="0"/>
-        </a:xfrm>
-      </p:grpSpPr>
-      <p:sp>
-        <p:nvSpPr>
-          <p:cNvPr id="22530" name="Rectangle 7"/>
-          <p:cNvSpPr>
-            <a:spLocks noGrp="1" noChangeArrowheads="1"/>
-          </p:cNvSpPr>
-          <p:nvPr>
-            <p:ph type="sldNum" sz="quarter" idx="5"/>
-          </p:nvPr>
-        </p:nvSpPr>
-        <p:spPr>
-          <a:noFill/>
-        </p:spPr>
-        <p:txBody>
-          <a:bodyPr/>
-          <a:lstStyle/>
-          <a:p>
-            <a:fld id="{9718FB86-B29B-224C-B84C-67881F2A305E}" type="slidenum">
-              <a:rPr lang="en-US">
-                <a:latin typeface="Arial" pitchFamily="-65" charset="0"/>
-                <a:ea typeface="ＭＳ Ｐゴシック" pitchFamily="-65" charset="-128"/>
-                <a:cs typeface="ＭＳ Ｐゴシック" pitchFamily="-65" charset="-128"/>
-              </a:rPr>
-              <a:pPr/>
-              <a:t>14</a:t>
-            </a:fld>
-            <a:endParaRPr lang="en-US">
-              <a:latin typeface="Arial" pitchFamily="-65" charset="0"/>
-              <a:ea typeface="ＭＳ Ｐゴシック" pitchFamily="-65" charset="-128"/>
-              <a:cs typeface="ＭＳ Ｐゴシック" pitchFamily="-65" charset="-128"/>
-            </a:endParaRPr>
-          </a:p>
-        </p:txBody>
-      </p:sp>
-      <p:sp>
-        <p:nvSpPr>
-          <p:cNvPr id="22531" name="Rectangle 2"/>
-          <p:cNvSpPr>
-            <a:spLocks noChangeArrowheads="1" noTextEdit="1"/>
-          </p:cNvSpPr>
-          <p:nvPr>
-            <p:ph type="sldImg"/>
-          </p:nvPr>
-        </p:nvSpPr>
-        <p:spPr>
-          <a:ln/>
-        </p:spPr>
-      </p:sp>
-      <p:sp>
-        <p:nvSpPr>
-          <p:cNvPr id="22532" name="Rectangle 3"/>
-          <p:cNvSpPr>
-            <a:spLocks noGrp="1" noChangeArrowheads="1"/>
-          </p:cNvSpPr>
-          <p:nvPr>
-            <p:ph type="body" idx="1"/>
-          </p:nvPr>
-        </p:nvSpPr>
-        <p:spPr>
-          <a:noFill/>
-          <a:ln/>
-        </p:spPr>
-        <p:txBody>
-          <a:bodyPr/>
-          <a:lstStyle/>
-          <a:p>
-            <a:pPr eaLnBrk="1" hangingPunct="1"/>
-            <a:r>
-              <a:rPr lang="en-US" smtClean="0">
-                <a:latin typeface="Arial" pitchFamily="-65" charset="0"/>
-                <a:ea typeface="ＭＳ Ｐゴシック" pitchFamily="-65" charset="-128"/>
-                <a:cs typeface="ＭＳ Ｐゴシック" pitchFamily="-65" charset="-128"/>
-              </a:rPr>
-              <a:t>There weren’t any Grid monitoring systems when we started Inca but today here is a sampling of the most common onethat have either been developed or adapted to do Grid monitoring. One key difference is Inca’s ability to collect a wide variety of monitoring data from functionality to performance data.   But the main difference between Inca and these other tools is our the method of monitoring.  A lot of these tools focus on aggregating each site’s system-level monitoring data such such as queue information while we focus on emulating a user’s experience.</a:t>
-            </a:r>
-          </a:p>
-        </p:txBody>
-      </p:sp>
-    </p:spTree>
-  </p:cSld>
-  <p:clrMapOvr>
-    <a:masterClrMapping/>
-  </p:clrMapOvr>
-</p:notes>
-</file>
-
 <file path=ppt/notesSlides/notesSlide2.xml><?xml version="1.0" encoding="utf-8"?>
 <p:notes xmlns:a="http://schemas.openxmlformats.org/drawingml/2006/main" xmlns:r="http://schemas.openxmlformats.org/officeDocument/2006/relationships" xmlns:mc="http://schemas.openxmlformats.org/markup-compatibility/2006" xmlns:mv="urn:schemas-microsoft-com:mac:vml" xmlns:p="http://schemas.openxmlformats.org/presentationml/2006/main" mc:Ignorable="mv" mc:PreserveAttributes="mv:*">
   <p:cSld>
@@ -1084,7 +979,7 @@
       </p:grpSpPr>
       <p:sp>
         <p:nvSpPr>
-          <p:cNvPr id="20482" name="Rectangle 7"/>
+          <p:cNvPr id="22530" name="Rectangle 7"/>
           <p:cNvSpPr>
             <a:spLocks noGrp="1" noChangeArrowheads="1"/>
           </p:cNvSpPr>
@@ -1099,7 +994,7 @@
           <a:bodyPr/>
           <a:lstStyle/>
           <a:p>
-            <a:fld id="{92322092-7E45-DD4B-AED1-2121405B2E49}" type="slidenum">
+            <a:fld id="{2322F7B9-7C72-254F-BA5B-39264804B335}" type="slidenum">
               <a:rPr lang="en-US">
                 <a:latin typeface="Arial" pitchFamily="-65" charset="0"/>
                 <a:ea typeface="ＭＳ Ｐゴシック" pitchFamily="-65" charset="-128"/>
@@ -1118,7 +1013,7 @@
       </p:sp>
       <p:sp>
         <p:nvSpPr>
-          <p:cNvPr id="20483" name="Rectangle 2"/>
+          <p:cNvPr id="22531" name="Rectangle 2"/>
           <p:cNvSpPr>
             <a:spLocks noChangeArrowheads="1"/>
           </p:cNvSpPr>
@@ -1127,10 +1022,6 @@
           </p:nvPr>
         </p:nvSpPr>
         <p:spPr>
-          <a:xfrm>
-            <a:off x="1281113" y="609600"/>
-            <a:ext cx="4333875" cy="3251200"/>
-          </a:xfrm>
           <a:solidFill>
             <a:srgbClr val="FFFFFF"/>
           </a:solidFill>
@@ -1139,7 +1030,7 @@
       </p:sp>
       <p:sp>
         <p:nvSpPr>
-          <p:cNvPr id="20484" name="Rectangle 3"/>
+          <p:cNvPr id="22532" name="Rectangle 3"/>
           <p:cNvSpPr>
             <a:spLocks noChangeArrowheads="1"/>
           </p:cNvSpPr>
@@ -1148,10 +1039,6 @@
           </p:nvPr>
         </p:nvSpPr>
         <p:spPr>
-          <a:xfrm>
-            <a:off x="228600" y="3962400"/>
-            <a:ext cx="6515100" cy="4495800"/>
-          </a:xfrm>
           <a:solidFill>
             <a:srgbClr val="FFFFFF"/>
           </a:solidFill>
@@ -1166,124 +1053,7 @@
           <a:lstStyle/>
           <a:p>
             <a:pPr eaLnBrk="1" hangingPunct="1"/>
-            <a:r>
-              <a:rPr lang="en-US" smtClean="0">
-                <a:latin typeface="Arial" pitchFamily="-65" charset="0"/>
-                <a:ea typeface="ＭＳ Ｐゴシック" pitchFamily="-65" charset="-128"/>
-                <a:cs typeface="ＭＳ Ｐゴシック" pitchFamily="-65" charset="-128"/>
-              </a:rPr>
-              <a:t>The primary goal in the creation of Grids is to provide unified and coherent</a:t>
-            </a:r>
-          </a:p>
-          <a:p>
-            <a:pPr eaLnBrk="1" hangingPunct="1"/>
-            <a:r>
-              <a:rPr lang="en-US" smtClean="0">
-                <a:latin typeface="Arial" pitchFamily="-65" charset="0"/>
-                <a:ea typeface="ＭＳ Ｐゴシック" pitchFamily="-65" charset="-128"/>
-                <a:cs typeface="ＭＳ Ｐゴシック" pitchFamily="-65" charset="-128"/>
-              </a:rPr>
-              <a:t>access to distributed computing, data storage and analysis, instruments, and</a:t>
-            </a:r>
-          </a:p>
-          <a:p>
-            <a:pPr eaLnBrk="1" hangingPunct="1"/>
-            <a:r>
-              <a:rPr lang="en-US" smtClean="0">
-                <a:latin typeface="Arial" pitchFamily="-65" charset="0"/>
-                <a:ea typeface="ＭＳ Ｐゴシック" pitchFamily="-65" charset="-128"/>
-                <a:cs typeface="ＭＳ Ｐゴシック" pitchFamily="-65" charset="-128"/>
-              </a:rPr>
-              <a:t>other resources to advance scientific exploration.  </a:t>
-            </a:r>
-          </a:p>
-          <a:p>
-            <a:pPr eaLnBrk="1" hangingPunct="1"/>
-            <a:endParaRPr lang="en-US" smtClean="0">
-              <a:latin typeface="Arial" pitchFamily="-65" charset="0"/>
-              <a:ea typeface="ＭＳ Ｐゴシック" pitchFamily="-65" charset="-128"/>
-              <a:cs typeface="ＭＳ Ｐゴシック" pitchFamily="-65" charset="-128"/>
-            </a:endParaRPr>
-          </a:p>
-          <a:p>
-            <a:pPr eaLnBrk="1" hangingPunct="1"/>
-            <a:r>
-              <a:rPr lang="en-US" smtClean="0">
-                <a:latin typeface="Arial" pitchFamily="-65" charset="0"/>
-                <a:ea typeface="ＭＳ Ｐゴシック" pitchFamily="-65" charset="-128"/>
-                <a:cs typeface="ＭＳ Ｐゴシック" pitchFamily="-65" charset="-128"/>
-              </a:rPr>
-              <a:t>The resources of a Grid provide hundreds to thousands services which adds more capabilities but also adds more complexity which leads to an increased probabillity that something will fail.  This is complicated by the fact that Gridst span several administrative domains.</a:t>
-            </a:r>
-          </a:p>
-          <a:p>
-            <a:pPr eaLnBrk="1" hangingPunct="1"/>
-            <a:endParaRPr lang="en-US" smtClean="0">
-              <a:latin typeface="Arial" pitchFamily="-65" charset="0"/>
-              <a:ea typeface="ＭＳ Ｐゴシック" pitchFamily="-65" charset="-128"/>
-              <a:cs typeface="ＭＳ Ｐゴシック" pitchFamily="-65" charset="-128"/>
-            </a:endParaRPr>
-          </a:p>
-          <a:p>
-            <a:pPr eaLnBrk="1" hangingPunct="1"/>
-            <a:r>
-              <a:rPr lang="en-US" smtClean="0">
-                <a:latin typeface="Arial" pitchFamily="-65" charset="0"/>
-                <a:ea typeface="ＭＳ Ｐゴシック" pitchFamily="-65" charset="-128"/>
-                <a:cs typeface="ＭＳ Ｐゴシック" pitchFamily="-65" charset="-128"/>
-              </a:rPr>
-              <a:t>One such Grid is the TeraGrid is a project funded by NSF and is a collaboration of several supercomputer centers across the US.  provides 21 resources across 11 sites</a:t>
-            </a:r>
-          </a:p>
-          <a:p>
-            <a:pPr eaLnBrk="1" hangingPunct="1"/>
-            <a:endParaRPr lang="en-US" smtClean="0">
-              <a:latin typeface="Arial" pitchFamily="-65" charset="0"/>
-              <a:ea typeface="ＭＳ Ｐゴシック" pitchFamily="-65" charset="-128"/>
-              <a:cs typeface="ＭＳ Ｐゴシック" pitchFamily="-65" charset="-128"/>
-            </a:endParaRPr>
-          </a:p>
-          <a:p>
-            <a:pPr eaLnBrk="1" hangingPunct="1"/>
-            <a:endParaRPr lang="en-US" smtClean="0">
-              <a:latin typeface="Arial" pitchFamily="-65" charset="0"/>
-              <a:ea typeface="ＭＳ Ｐゴシック" pitchFamily="-65" charset="-128"/>
-              <a:cs typeface="ＭＳ Ｐゴシック" pitchFamily="-65" charset="-128"/>
-            </a:endParaRPr>
-          </a:p>
-          <a:p>
-            <a:pPr eaLnBrk="1" hangingPunct="1"/>
-            <a:endParaRPr lang="en-US" smtClean="0">
-              <a:latin typeface="Arial" pitchFamily="-65" charset="0"/>
-              <a:ea typeface="ＭＳ Ｐゴシック" pitchFamily="-65" charset="-128"/>
-              <a:cs typeface="ＭＳ Ｐゴシック" pitchFamily="-65" charset="-128"/>
-            </a:endParaRPr>
-          </a:p>
-          <a:p>
-            <a:pPr eaLnBrk="1" hangingPunct="1"/>
-            <a:r>
-              <a:rPr lang="en-US" smtClean="0">
-                <a:latin typeface="Arial" pitchFamily="-65" charset="0"/>
-                <a:ea typeface="ＭＳ Ｐゴシック" pitchFamily="-65" charset="-128"/>
-                <a:cs typeface="ＭＳ Ｐゴシック" pitchFamily="-65" charset="-128"/>
-              </a:rPr>
-              <a:t>, the problem we are addressing with Inca is the issue of reliability in Grids.  </a:t>
-            </a:r>
-          </a:p>
-          <a:p>
-            <a:pPr eaLnBrk="1" hangingPunct="1"/>
-            <a:r>
-              <a:rPr lang="en-US" smtClean="0">
-                <a:latin typeface="Arial" pitchFamily="-65" charset="0"/>
-                <a:ea typeface="ＭＳ Ｐゴシック" pitchFamily="-65" charset="-128"/>
-                <a:cs typeface="ＭＳ Ｐゴシック" pitchFamily="-65" charset="-128"/>
-              </a:rPr>
-              <a:t>One of its TeraGrid’s activities in order to support and encourage the execution of Grid applications is to provide a coordinated software environment known as CTSS. CTSS contains packages such as Globus, Storage Resource Broker, MyProxy, and GSI-SSH and environment setup using a tool called SoftEnv.  The goal of this was so developers and users could focus their effort of porting their Grid applications to machine architecture differences  rather than the middleware. When CTSS was first deployed, there were many inconsistencies between sites due to misunderstandings of the specifications or misconfigurations of the software itself. These inconsistencies along with software failures in general is something we wanted to monitor in order to provide a stable environment to users.</a:t>
-            </a:r>
-          </a:p>
-          <a:p>
-            <a:pPr eaLnBrk="1" hangingPunct="1"/>
-            <a:endParaRPr lang="en-US" smtClean="0">
+            <a:endParaRPr lang="en-US">
               <a:latin typeface="Arial" pitchFamily="-65" charset="0"/>
               <a:ea typeface="ＭＳ Ｐゴシック" pitchFamily="-65" charset="-128"/>
               <a:cs typeface="ＭＳ Ｐゴシック" pitchFamily="-65" charset="-128"/>
@@ -1318,7 +1088,7 @@
       </p:grpSpPr>
       <p:sp>
         <p:nvSpPr>
-          <p:cNvPr id="22530" name="Rectangle 7"/>
+          <p:cNvPr id="24578" name="Rectangle 7"/>
           <p:cNvSpPr>
             <a:spLocks noGrp="1" noChangeArrowheads="1"/>
           </p:cNvSpPr>
@@ -1333,7 +1103,7 @@
           <a:bodyPr/>
           <a:lstStyle/>
           <a:p>
-            <a:fld id="{2322F7B9-7C72-254F-BA5B-39264804B335}" type="slidenum">
+            <a:fld id="{B4E2A46B-2AA1-7741-8133-9A48CCB021EC}" type="slidenum">
               <a:rPr lang="en-US">
                 <a:latin typeface="Arial" pitchFamily="-65" charset="0"/>
                 <a:ea typeface="ＭＳ Ｐゴシック" pitchFamily="-65" charset="-128"/>
@@ -1352,7 +1122,7 @@
       </p:sp>
       <p:sp>
         <p:nvSpPr>
-          <p:cNvPr id="22531" name="Rectangle 2"/>
+          <p:cNvPr id="24579" name="Rectangle 2"/>
           <p:cNvSpPr>
             <a:spLocks noChangeArrowheads="1"/>
           </p:cNvSpPr>
@@ -1361,6 +1131,10 @@
           </p:nvPr>
         </p:nvSpPr>
         <p:spPr>
+          <a:xfrm>
+            <a:off x="1281113" y="609600"/>
+            <a:ext cx="4333875" cy="3251200"/>
+          </a:xfrm>
           <a:solidFill>
             <a:srgbClr val="FFFFFF"/>
           </a:solidFill>
@@ -1369,7 +1143,7 @@
       </p:sp>
       <p:sp>
         <p:nvSpPr>
-          <p:cNvPr id="22532" name="Rectangle 3"/>
+          <p:cNvPr id="24580" name="Rectangle 3"/>
           <p:cNvSpPr>
             <a:spLocks noChangeArrowheads="1"/>
           </p:cNvSpPr>
@@ -1378,6 +1152,10 @@
           </p:nvPr>
         </p:nvSpPr>
         <p:spPr>
+          <a:xfrm>
+            <a:off x="228600" y="3962400"/>
+            <a:ext cx="6515100" cy="4495800"/>
+          </a:xfrm>
           <a:solidFill>
             <a:srgbClr val="FFFFFF"/>
           </a:solidFill>
@@ -1391,8 +1169,302 @@
           <a:bodyPr/>
           <a:lstStyle/>
           <a:p>
+            <a:r>
+              <a:rPr lang="en-US" b="1" dirty="0" smtClean="0">
+                <a:latin typeface="Arial" pitchFamily="-65" charset="0"/>
+                <a:ea typeface="ＭＳ Ｐゴシック" pitchFamily="-65" charset="-128"/>
+                <a:cs typeface="ＭＳ Ｐゴシック" pitchFamily="-65" charset="-128"/>
+              </a:rPr>
+              <a:t>The architecture of Inca is illustrated in the figure.  It is composed of a number of server components which control, store, and display results, and a lightweight component which runs on each of the monitored resources.  Some of the key features that Inca provides is to </a:t>
+            </a:r>
+          </a:p>
+          <a:p>
+            <a:r>
+              <a:rPr lang="en-US" b="1" dirty="0" smtClean="0">
+                <a:latin typeface="Arial" pitchFamily="-65" charset="0"/>
+                <a:ea typeface="ＭＳ Ｐゴシック" pitchFamily="-65" charset="-128"/>
+                <a:cs typeface="ＭＳ Ｐゴシック" pitchFamily="-65" charset="-128"/>
+              </a:rPr>
+              <a:t>Enables consistent user-level testing across resources: +- Ensures consistent testing across resources with centralized test configuration.</a:t>
+            </a:r>
+          </a:p>
+          <a:p>
+            <a:r>
+              <a:rPr lang="en-US" b="1" dirty="0" smtClean="0">
+                <a:latin typeface="Arial" pitchFamily="-65" charset="0"/>
+                <a:ea typeface="ＭＳ Ｐゴシック" pitchFamily="-65" charset="-128"/>
+                <a:cs typeface="ＭＳ Ｐゴシック" pitchFamily="-65" charset="-128"/>
+              </a:rPr>
+              <a:t>Easy to configure and maintain:  Manages and collects a large number of results through a GUI interface (</a:t>
+            </a:r>
+            <a:r>
+              <a:rPr lang="en-US" b="1" dirty="0" err="1" smtClean="0">
+                <a:latin typeface="Arial" pitchFamily="-65" charset="0"/>
+                <a:ea typeface="ＭＳ Ｐゴシック" pitchFamily="-65" charset="-128"/>
+                <a:cs typeface="ＭＳ Ｐゴシック" pitchFamily="-65" charset="-128"/>
+              </a:rPr>
+              <a:t>incat</a:t>
+            </a:r>
+            <a:r>
+              <a:rPr lang="en-US" b="1" dirty="0" smtClean="0">
+                <a:latin typeface="Arial" pitchFamily="-65" charset="0"/>
+                <a:ea typeface="ＭＳ Ｐゴシック" pitchFamily="-65" charset="-128"/>
+                <a:cs typeface="ＭＳ Ｐゴシック" pitchFamily="-65" charset="-128"/>
+              </a:rPr>
+              <a:t>). </a:t>
+            </a:r>
+          </a:p>
+          <a:p>
+            <a:r>
+              <a:rPr lang="en-US" b="1" dirty="0" smtClean="0">
+                <a:latin typeface="Arial" pitchFamily="-65" charset="0"/>
+                <a:ea typeface="ＭＳ Ｐゴシック" pitchFamily="-65" charset="-128"/>
+                <a:cs typeface="ＭＳ Ｐゴシック" pitchFamily="-65" charset="-128"/>
+              </a:rPr>
+              <a:t>Easy to collect data from </a:t>
+            </a:r>
+            <a:r>
+              <a:rPr lang="en-US" b="1" dirty="0" err="1" smtClean="0">
+                <a:latin typeface="Arial" pitchFamily="-65" charset="0"/>
+                <a:ea typeface="ＭＳ Ｐゴシック" pitchFamily="-65" charset="-128"/>
+                <a:cs typeface="ＭＳ Ｐゴシック" pitchFamily="-65" charset="-128"/>
+              </a:rPr>
+              <a:t>resources: +Data</a:t>
+            </a:r>
+            <a:r>
+              <a:rPr lang="en-US" b="1" dirty="0" smtClean="0">
+                <a:latin typeface="Arial" pitchFamily="-65" charset="0"/>
+                <a:ea typeface="ＭＳ Ｐゴシック" pitchFamily="-65" charset="-128"/>
+                <a:cs typeface="ＭＳ Ｐゴシック" pitchFamily="-65" charset="-128"/>
+              </a:rPr>
+              <a:t> is collected by reporters, executables that measure some aspect of the system and output the result as XML. Multiple types of data can be collected. Perl APIs are provided to make it easy to write reporters; most are less than 30 lines of code.</a:t>
+            </a:r>
+          </a:p>
+          <a:p>
+            <a:r>
+              <a:rPr lang="en-US" b="1" dirty="0" smtClean="0">
+                <a:latin typeface="Arial" pitchFamily="-65" charset="0"/>
+                <a:ea typeface="ＭＳ Ｐゴシック" pitchFamily="-65" charset="-128"/>
+                <a:cs typeface="ＭＳ Ｐゴシック" pitchFamily="-65" charset="-128"/>
+              </a:rPr>
+              <a:t>Large variety of tests: Inca offers a number of prewritten test scripts, </a:t>
+            </a:r>
+            <a:r>
+              <a:rPr lang="en-US" b="1" dirty="0" err="1" smtClean="0">
+                <a:latin typeface="Arial" pitchFamily="-65" charset="0"/>
+                <a:ea typeface="ＭＳ Ｐゴシック" pitchFamily="-65" charset="-128"/>
+                <a:cs typeface="ＭＳ Ｐゴシック" pitchFamily="-65" charset="-128"/>
+              </a:rPr>
+              <a:t>called</a:t>
+            </a:r>
+            <a:r>
+              <a:rPr lang="en-US" b="1" u="sng" dirty="0" err="1" smtClean="0">
+                <a:latin typeface="Arial" pitchFamily="-65" charset="0"/>
+                <a:ea typeface="ＭＳ Ｐゴシック" pitchFamily="-65" charset="-128"/>
+                <a:cs typeface="ＭＳ Ｐゴシック" pitchFamily="-65" charset="-128"/>
+              </a:rPr>
+              <a:t>reporters</a:t>
+            </a:r>
+            <a:r>
+              <a:rPr lang="en-US" b="1" u="sng" dirty="0" smtClean="0">
+                <a:latin typeface="Arial" pitchFamily="-65" charset="0"/>
+                <a:ea typeface="ＭＳ Ｐゴシック" pitchFamily="-65" charset="-128"/>
+                <a:cs typeface="ＭＳ Ｐゴシック" pitchFamily="-65" charset="-128"/>
+              </a:rPr>
+              <a:t>, for monitoring Grid health. Reporter APIs make it easy to create new Inca tests.</a:t>
+            </a:r>
+          </a:p>
+          <a:p>
+            <a:r>
+              <a:rPr lang="en-US" b="1" u="sng" dirty="0" smtClean="0">
+                <a:latin typeface="Arial" pitchFamily="-65" charset="0"/>
+                <a:ea typeface="ＭＳ Ｐゴシック" pitchFamily="-65" charset="-128"/>
+                <a:cs typeface="ＭＳ Ｐゴシック" pitchFamily="-65" charset="-128"/>
+              </a:rPr>
+              <a:t>Archived results support </a:t>
+            </a:r>
+            <a:r>
+              <a:rPr lang="en-US" b="1" u="sng" dirty="0" err="1" smtClean="0">
+                <a:latin typeface="Arial" pitchFamily="-65" charset="0"/>
+                <a:ea typeface="ＭＳ Ｐゴシック" pitchFamily="-65" charset="-128"/>
+                <a:cs typeface="ＭＳ Ｐゴシック" pitchFamily="-65" charset="-128"/>
+              </a:rPr>
+              <a:t>troubleshooting +Furthers</a:t>
+            </a:r>
+            <a:r>
+              <a:rPr lang="en-US" b="1" u="sng" dirty="0" smtClean="0">
+                <a:latin typeface="Arial" pitchFamily="-65" charset="0"/>
+                <a:ea typeface="ＭＳ Ｐゴシック" pitchFamily="-65" charset="-128"/>
+                <a:cs typeface="ＭＳ Ｐゴシック" pitchFamily="-65" charset="-128"/>
+              </a:rPr>
+              <a:t> understanding of Grid behavior by storing and archiving complete monitoring results. </a:t>
+            </a:r>
+          </a:p>
+          <a:p>
+            <a:r>
+              <a:rPr lang="en-US" b="1" u="sng" dirty="0" smtClean="0">
+                <a:latin typeface="Arial" pitchFamily="-65" charset="0"/>
+                <a:ea typeface="ＭＳ Ｐゴシック" pitchFamily="-65" charset="-128"/>
+                <a:cs typeface="ＭＳ Ｐゴシック" pitchFamily="-65" charset="-128"/>
+              </a:rPr>
+              <a:t>Allows system administrators to debug detected failures using archived execution details.</a:t>
+            </a:r>
+          </a:p>
+          <a:p>
+            <a:r>
+              <a:rPr lang="en-US" b="1" u="sng" dirty="0" smtClean="0">
+                <a:latin typeface="Arial" pitchFamily="-65" charset="0"/>
+                <a:ea typeface="ＭＳ Ｐゴシック" pitchFamily="-65" charset="-128"/>
+                <a:cs typeface="ＭＳ Ｐゴシック" pitchFamily="-65" charset="-128"/>
+              </a:rPr>
+              <a:t>Comprehensive views of </a:t>
+            </a:r>
+            <a:r>
+              <a:rPr lang="en-US" b="1" u="sng" dirty="0" err="1" smtClean="0">
+                <a:latin typeface="Arial" pitchFamily="-65" charset="0"/>
+                <a:ea typeface="ＭＳ Ｐゴシック" pitchFamily="-65" charset="-128"/>
+                <a:cs typeface="ＭＳ Ｐゴシック" pitchFamily="-65" charset="-128"/>
+              </a:rPr>
+              <a:t>data: +Offers</a:t>
+            </a:r>
+            <a:r>
+              <a:rPr lang="en-US" b="1" u="sng" dirty="0" smtClean="0">
+                <a:latin typeface="Arial" pitchFamily="-65" charset="0"/>
+                <a:ea typeface="ＭＳ Ｐゴシック" pitchFamily="-65" charset="-128"/>
+                <a:cs typeface="ＭＳ Ｐゴシック" pitchFamily="-65" charset="-128"/>
+              </a:rPr>
+              <a:t> a variety of Grid data views from cumulative summaries to reporter execution details and result histories.</a:t>
+            </a:r>
+            <a:endParaRPr lang="en-US" dirty="0" smtClean="0">
+              <a:latin typeface="Arial" pitchFamily="-65" charset="0"/>
+              <a:ea typeface="ＭＳ Ｐゴシック" pitchFamily="-65" charset="-128"/>
+              <a:cs typeface="ＭＳ Ｐゴシック" pitchFamily="-65" charset="-128"/>
+            </a:endParaRPr>
+          </a:p>
+          <a:p>
+            <a:endParaRPr lang="en-US" dirty="0" smtClean="0">
+              <a:latin typeface="Arial" pitchFamily="-65" charset="0"/>
+              <a:ea typeface="ＭＳ Ｐゴシック" pitchFamily="-65" charset="-128"/>
+              <a:cs typeface="ＭＳ Ｐゴシック" pitchFamily="-65" charset="-128"/>
+            </a:endParaRPr>
+          </a:p>
+          <a:p>
+            <a:r>
+              <a:rPr lang="en-US" dirty="0" smtClean="0">
+                <a:latin typeface="Arial" pitchFamily="-65" charset="0"/>
+                <a:ea typeface="ＭＳ Ｐゴシック" pitchFamily="-65" charset="-128"/>
+                <a:cs typeface="ＭＳ Ｐゴシック" pitchFamily="-65" charset="-128"/>
+              </a:rPr>
+              <a:t>We designed Inca to implement this user-level Grid monitoring and In addition to the features presented in the previous slide, Inca…</a:t>
+            </a:r>
+          </a:p>
+          <a:p>
+            <a:pPr>
+              <a:buFontTx/>
+              <a:buChar char="•"/>
+            </a:pPr>
+            <a:r>
+              <a:rPr lang="en-US" dirty="0" smtClean="0">
+                <a:latin typeface="Arial" pitchFamily="-65" charset="0"/>
+                <a:ea typeface="ＭＳ Ｐゴシック" pitchFamily="-65" charset="-128"/>
+                <a:cs typeface="ＭＳ Ｐゴシック" pitchFamily="-65" charset="-128"/>
+              </a:rPr>
+              <a:t>Collects more than pass/fail data such as error messages, version information, and performance information.</a:t>
+            </a:r>
+          </a:p>
+          <a:p>
+            <a:pPr>
+              <a:buFontTx/>
+              <a:buChar char="•"/>
+            </a:pPr>
+            <a:r>
+              <a:rPr lang="en-US" dirty="0" smtClean="0">
+                <a:latin typeface="Arial" pitchFamily="-65" charset="0"/>
+                <a:ea typeface="ＭＳ Ｐゴシック" pitchFamily="-65" charset="-128"/>
+                <a:cs typeface="ＭＳ Ｐゴシック" pitchFamily="-65" charset="-128"/>
+              </a:rPr>
+              <a:t>Inca also captures the context of a monitoring result as it executes such as the script name, version, arguments, etc so that when Inca reports an error, there is enough information for a system admin to understand how the result was collected for so they can either debug the problem or inform us that the test is testing the wrong thing. It also reports the system usage so that the impact of the testing can be understood so that you can reduce the frequency of a test if it’s taking too much resources.  Mention in future work automatically tune frequency based on impact and past history</a:t>
+            </a:r>
+          </a:p>
+          <a:p>
+            <a:pPr>
+              <a:buFontTx/>
+              <a:buChar char="•"/>
+            </a:pPr>
+            <a:r>
+              <a:rPr lang="en-US" dirty="0" smtClean="0">
+                <a:latin typeface="Arial" pitchFamily="-65" charset="0"/>
+                <a:ea typeface="ＭＳ Ｐゴシック" pitchFamily="-65" charset="-128"/>
+                <a:cs typeface="ＭＳ Ｐゴシック" pitchFamily="-65" charset="-128"/>
+              </a:rPr>
+              <a:t>Inca also provides mechanisms to make it easy to write a new test or benchmark and propagate it out the monitored resources.  More later.</a:t>
+            </a:r>
+          </a:p>
+          <a:p>
+            <a:pPr>
+              <a:buFontTx/>
+              <a:buChar char="•"/>
+            </a:pPr>
+            <a:r>
+              <a:rPr lang="en-US" dirty="0" smtClean="0">
+                <a:latin typeface="Arial" pitchFamily="-65" charset="0"/>
+                <a:ea typeface="ＭＳ Ｐゴシック" pitchFamily="-65" charset="-128"/>
+                <a:cs typeface="ＭＳ Ｐゴシック" pitchFamily="-65" charset="-128"/>
+              </a:rPr>
+              <a:t>Finally, because we are testing Grid services, a valid GSI credential is needed to authenticate to services.  Inca provides facilities to securely download a short-term proxy for a particular test or benchmark and then cleans it off the system so as to a proxy is only on the machine for the time that it’s needed.  Finally, all components communicate using SSL.</a:t>
+            </a:r>
+          </a:p>
+          <a:p>
+            <a:pPr>
+              <a:buFontTx/>
+              <a:buChar char="•"/>
+            </a:pPr>
+            <a:r>
+              <a:rPr lang="en-US" dirty="0" smtClean="0">
+                <a:latin typeface="Arial" pitchFamily="-65" charset="0"/>
+                <a:ea typeface="ＭＳ Ｐゴシック" pitchFamily="-65" charset="-128"/>
+                <a:cs typeface="ＭＳ Ｐゴシック" pitchFamily="-65" charset="-128"/>
+              </a:rPr>
+              <a:t>The figure here shows the architecture of a typical Inca deployment.  The components inside the gray box indicate the core components of Inca.  So, the way it works is that an administrator for Inca would have a set of monitoring data they want to collect from resources.  The admin would use a GUI client called </a:t>
+            </a:r>
+            <a:r>
+              <a:rPr lang="en-US" dirty="0" err="1" smtClean="0">
+                <a:latin typeface="Arial" pitchFamily="-65" charset="0"/>
+                <a:ea typeface="ＭＳ Ｐゴシック" pitchFamily="-65" charset="-128"/>
+                <a:cs typeface="ＭＳ Ｐゴシック" pitchFamily="-65" charset="-128"/>
+              </a:rPr>
+              <a:t>Incat</a:t>
+            </a:r>
+            <a:r>
+              <a:rPr lang="en-US" dirty="0" smtClean="0">
+                <a:latin typeface="Arial" pitchFamily="-65" charset="0"/>
+                <a:ea typeface="ＭＳ Ｐゴシック" pitchFamily="-65" charset="-128"/>
+                <a:cs typeface="ＭＳ Ｐゴシック" pitchFamily="-65" charset="-128"/>
+              </a:rPr>
+              <a:t> to generate a configuration (stored in XML) for that monitoring data that contains the names of the tests they want to run, their parameters, execution frequency, and resources.  That configuration is then sent to the agent component which downloads the tests from a repository and stages and launches a client called the reporter manager on each monitored resource.  As each RM runs a test at its scheduled time, the data is stored in a component called the depot where it can be queried and displayed by a data consumer in a web page for example.  </a:t>
+            </a:r>
+          </a:p>
+          <a:p>
+            <a:pPr>
+              <a:buFontTx/>
+              <a:buChar char="•"/>
+            </a:pPr>
+            <a:r>
+              <a:rPr lang="en-US" dirty="0" smtClean="0">
+                <a:latin typeface="Arial" pitchFamily="-65" charset="0"/>
+                <a:ea typeface="ＭＳ Ｐゴシック" pitchFamily="-65" charset="-128"/>
+                <a:cs typeface="ＭＳ Ｐゴシック" pitchFamily="-65" charset="-128"/>
+              </a:rPr>
+              <a:t>Talk a bit more about each component using from the bottom-up.</a:t>
+            </a:r>
+          </a:p>
+          <a:p>
             <a:pPr eaLnBrk="1" hangingPunct="1"/>
-            <a:endParaRPr lang="en-US">
+            <a:endParaRPr lang="en-US" dirty="0" smtClean="0">
               <a:latin typeface="Arial" pitchFamily="-65" charset="0"/>
               <a:ea typeface="ＭＳ Ｐゴシック" pitchFamily="-65" charset="-128"/>
               <a:cs typeface="ＭＳ Ｐゴシック" pitchFamily="-65" charset="-128"/>
@@ -1427,7 +1499,7 @@
       </p:grpSpPr>
       <p:sp>
         <p:nvSpPr>
-          <p:cNvPr id="24578" name="Rectangle 7"/>
+          <p:cNvPr id="30722" name="Rectangle 7"/>
           <p:cNvSpPr>
             <a:spLocks noGrp="1" noChangeArrowheads="1"/>
           </p:cNvSpPr>
@@ -1442,7 +1514,7 @@
           <a:bodyPr/>
           <a:lstStyle/>
           <a:p>
-            <a:fld id="{B4E2A46B-2AA1-7741-8133-9A48CCB021EC}" type="slidenum">
+            <a:fld id="{532DF2D0-FDD5-7546-9EBA-D1830D2A5D30}" type="slidenum">
               <a:rPr lang="en-US">
                 <a:latin typeface="Arial" pitchFamily="-65" charset="0"/>
                 <a:ea typeface="ＭＳ Ｐゴシック" pitchFamily="-65" charset="-128"/>
@@ -1461,7 +1533,7 @@
       </p:sp>
       <p:sp>
         <p:nvSpPr>
-          <p:cNvPr id="24579" name="Rectangle 2"/>
+          <p:cNvPr id="30723" name="Rectangle 2"/>
           <p:cNvSpPr>
             <a:spLocks noChangeArrowheads="1"/>
           </p:cNvSpPr>
@@ -1471,8 +1543,8 @@
         </p:nvSpPr>
         <p:spPr>
           <a:xfrm>
-            <a:off x="1281113" y="609600"/>
-            <a:ext cx="4333875" cy="3251200"/>
+            <a:off x="2228850" y="609600"/>
+            <a:ext cx="2438400" cy="3251200"/>
           </a:xfrm>
           <a:solidFill>
             <a:srgbClr val="FFFFFF"/>
@@ -1482,7 +1554,7 @@
       </p:sp>
       <p:sp>
         <p:nvSpPr>
-          <p:cNvPr id="24580" name="Rectangle 3"/>
+          <p:cNvPr id="30724" name="Rectangle 3"/>
           <p:cNvSpPr>
             <a:spLocks noChangeArrowheads="1"/>
           </p:cNvSpPr>
@@ -1508,206 +1580,11 @@
           <a:bodyPr/>
           <a:lstStyle/>
           <a:p>
-            <a:r>
-              <a:rPr lang="en-US" b="1" smtClean="0">
-                <a:latin typeface="Arial" pitchFamily="-65" charset="0"/>
-                <a:ea typeface="ＭＳ Ｐゴシック" pitchFamily="-65" charset="-128"/>
-                <a:cs typeface="ＭＳ Ｐゴシック" pitchFamily="-65" charset="-128"/>
-              </a:rPr>
-              <a:t>The architecture of Inca is illustrated in the figure.  It is composed of a number of server components which control, store, and display results, and a lightweight component which runs on each of the monitored resources.  Some of the key features that Inca provides is to </a:t>
-            </a:r>
-          </a:p>
-          <a:p>
-            <a:r>
-              <a:rPr lang="en-US" b="1" smtClean="0">
-                <a:latin typeface="Arial" pitchFamily="-65" charset="0"/>
-                <a:ea typeface="ＭＳ Ｐゴシック" pitchFamily="-65" charset="-128"/>
-                <a:cs typeface="ＭＳ Ｐゴシック" pitchFamily="-65" charset="-128"/>
-              </a:rPr>
-              <a:t>Enables consistent user-level testing across resources: -- Ensures consistent testing across resources with centralized test configuration.</a:t>
-            </a:r>
-          </a:p>
-          <a:p>
-            <a:r>
-              <a:rPr lang="en-US" b="1" smtClean="0">
-                <a:latin typeface="Arial" pitchFamily="-65" charset="0"/>
-                <a:ea typeface="ＭＳ Ｐゴシック" pitchFamily="-65" charset="-128"/>
-                <a:cs typeface="ＭＳ Ｐゴシック" pitchFamily="-65" charset="-128"/>
-              </a:rPr>
-              <a:t>Easy to configure and maintain:  Manages and collects a large number of results through a GUI interface (incat). </a:t>
-            </a:r>
-          </a:p>
-          <a:p>
-            <a:r>
-              <a:rPr lang="en-US" b="1" smtClean="0">
-                <a:latin typeface="Arial" pitchFamily="-65" charset="0"/>
-                <a:ea typeface="ＭＳ Ｐゴシック" pitchFamily="-65" charset="-128"/>
-                <a:cs typeface="ＭＳ Ｐゴシック" pitchFamily="-65" charset="-128"/>
-              </a:rPr>
-              <a:t>Easy to collect data from resources: -Data is collected by reporters, executables that measure some aspect of the system and output the result as XML. Multiple types of data can be collected. Perl APIs are provided to make it easy to write reporters; most are less than 30 lines of code.</a:t>
-            </a:r>
-          </a:p>
-          <a:p>
-            <a:r>
-              <a:rPr lang="en-US" b="1" smtClean="0">
-                <a:latin typeface="Arial" pitchFamily="-65" charset="0"/>
-                <a:ea typeface="ＭＳ Ｐゴシック" pitchFamily="-65" charset="-128"/>
-                <a:cs typeface="ＭＳ Ｐゴシック" pitchFamily="-65" charset="-128"/>
-              </a:rPr>
-              <a:t>Large variety of tests: Inca offers a number of prewritten test scripts, called</a:t>
-            </a:r>
-            <a:r>
-              <a:rPr lang="en-US" b="1" u="sng" smtClean="0">
-                <a:latin typeface="Arial" pitchFamily="-65" charset="0"/>
-                <a:ea typeface="ＭＳ Ｐゴシック" pitchFamily="-65" charset="-128"/>
-                <a:cs typeface="ＭＳ Ｐゴシック" pitchFamily="-65" charset="-128"/>
-              </a:rPr>
-              <a:t>reporters, for monitoring Grid health. Reporter APIs make it easy to create new Inca tests.</a:t>
-            </a:r>
-          </a:p>
-          <a:p>
-            <a:r>
-              <a:rPr lang="en-US" b="1" u="sng" smtClean="0">
-                <a:latin typeface="Arial" pitchFamily="-65" charset="0"/>
-                <a:ea typeface="ＭＳ Ｐゴシック" pitchFamily="-65" charset="-128"/>
-                <a:cs typeface="ＭＳ Ｐゴシック" pitchFamily="-65" charset="-128"/>
-              </a:rPr>
-              <a:t>Archived results support troubleshooting -Furthers understanding of Grid behavior by storing and archiving complete monitoring results. </a:t>
-            </a:r>
-          </a:p>
-          <a:p>
-            <a:r>
-              <a:rPr lang="en-US" b="1" u="sng" smtClean="0">
-                <a:latin typeface="Arial" pitchFamily="-65" charset="0"/>
-                <a:ea typeface="ＭＳ Ｐゴシック" pitchFamily="-65" charset="-128"/>
-                <a:cs typeface="ＭＳ Ｐゴシック" pitchFamily="-65" charset="-128"/>
-              </a:rPr>
-              <a:t>Allows system administrators to debug detected failures using archived execution details.</a:t>
-            </a:r>
-          </a:p>
-          <a:p>
-            <a:r>
-              <a:rPr lang="en-US" b="1" u="sng" smtClean="0">
-                <a:latin typeface="Arial" pitchFamily="-65" charset="0"/>
-                <a:ea typeface="ＭＳ Ｐゴシック" pitchFamily="-65" charset="-128"/>
-                <a:cs typeface="ＭＳ Ｐゴシック" pitchFamily="-65" charset="-128"/>
-              </a:rPr>
-              <a:t>Comprehensive views of data: -Offers a variety of Grid data views from cumulative summaries to reporter execution details and result histories.</a:t>
-            </a:r>
-            <a:endParaRPr lang="en-US" smtClean="0">
-              <a:latin typeface="Arial" pitchFamily="-65" charset="0"/>
-              <a:ea typeface="ＭＳ Ｐゴシック" pitchFamily="-65" charset="-128"/>
-              <a:cs typeface="ＭＳ Ｐゴシック" pitchFamily="-65" charset="-128"/>
-            </a:endParaRPr>
-          </a:p>
-          <a:p>
-            <a:endParaRPr lang="en-US" smtClean="0">
-              <a:latin typeface="Arial" pitchFamily="-65" charset="0"/>
-              <a:ea typeface="ＭＳ Ｐゴシック" pitchFamily="-65" charset="-128"/>
-              <a:cs typeface="ＭＳ Ｐゴシック" pitchFamily="-65" charset="-128"/>
-            </a:endParaRPr>
-          </a:p>
-          <a:p>
-            <a:r>
-              <a:rPr lang="en-US" smtClean="0">
-                <a:latin typeface="Arial" pitchFamily="-65" charset="0"/>
-                <a:ea typeface="ＭＳ Ｐゴシック" pitchFamily="-65" charset="-128"/>
-                <a:cs typeface="ＭＳ Ｐゴシック" pitchFamily="-65" charset="-128"/>
-              </a:rPr>
-              <a:t>We designed Inca to implement this user-level Grid monitoring and In addition to the features presented in the previous slide, Inca…</a:t>
-            </a:r>
-          </a:p>
-          <a:p>
-            <a:pPr>
+            <a:pPr eaLnBrk="1" hangingPunct="1">
               <a:buFontTx/>
               <a:buChar char="•"/>
             </a:pPr>
-            <a:r>
-              <a:rPr lang="en-US" smtClean="0">
-                <a:latin typeface="Arial" pitchFamily="-65" charset="0"/>
-                <a:ea typeface="ＭＳ Ｐゴシック" pitchFamily="-65" charset="-128"/>
-                <a:cs typeface="ＭＳ Ｐゴシック" pitchFamily="-65" charset="-128"/>
-              </a:rPr>
-              <a:t>Collects more than pass/fail data such as error messages, version information, and performance information.</a:t>
-            </a:r>
-          </a:p>
-          <a:p>
-            <a:pPr>
-              <a:buFontTx/>
-              <a:buChar char="•"/>
-            </a:pPr>
-            <a:r>
-              <a:rPr lang="en-US" smtClean="0">
-                <a:latin typeface="Arial" pitchFamily="-65" charset="0"/>
-                <a:ea typeface="ＭＳ Ｐゴシック" pitchFamily="-65" charset="-128"/>
-                <a:cs typeface="ＭＳ Ｐゴシック" pitchFamily="-65" charset="-128"/>
-              </a:rPr>
-              <a:t>Inca also captures the context of a monitoring result as it executes such as the script name, version, arguments, etc so that when Inca reports an error, there is enough information for a system admin to understand how the result was collected for so they can either debug the problem or inform us that the test is testing the wrong thing. It also reports the system usage so that the impact of the testing can be understood so that you can reduce the frequency of a test if it’s taking too much resources.  Mention in future work automatically tune frequency based on impact and past history</a:t>
-            </a:r>
-          </a:p>
-          <a:p>
-            <a:pPr>
-              <a:buFontTx/>
-              <a:buChar char="•"/>
-            </a:pPr>
-            <a:r>
-              <a:rPr lang="en-US" smtClean="0">
-                <a:latin typeface="Arial" pitchFamily="-65" charset="0"/>
-                <a:ea typeface="ＭＳ Ｐゴシック" pitchFamily="-65" charset="-128"/>
-                <a:cs typeface="ＭＳ Ｐゴシック" pitchFamily="-65" charset="-128"/>
-              </a:rPr>
-              <a:t>Inca also provides mechanisms to make it easy to write a new test or benchmark and propagate it out the monitored resources.  More later.</a:t>
-            </a:r>
-          </a:p>
-          <a:p>
-            <a:pPr>
-              <a:buFontTx/>
-              <a:buChar char="•"/>
-            </a:pPr>
-            <a:r>
-              <a:rPr lang="en-US" smtClean="0">
-                <a:latin typeface="Arial" pitchFamily="-65" charset="0"/>
-                <a:ea typeface="ＭＳ Ｐゴシック" pitchFamily="-65" charset="-128"/>
-                <a:cs typeface="ＭＳ Ｐゴシック" pitchFamily="-65" charset="-128"/>
-              </a:rPr>
-              <a:t>Finally, because we are testing Grid services, a valid GSI credential is needed to authenticate to services.  Inca provides facilities to securely download a short-term proxy for a particular test or benchmark and then cleans it off the system so as to a proxy is only on the machine for the time that it’s needed.  Finally, all components communicate using SSL.</a:t>
-            </a:r>
-          </a:p>
-          <a:p>
-            <a:pPr>
-              <a:buFontTx/>
-              <a:buChar char="•"/>
-            </a:pPr>
-            <a:r>
-              <a:rPr lang="en-US" smtClean="0">
-                <a:latin typeface="Arial" pitchFamily="-65" charset="0"/>
-                <a:ea typeface="ＭＳ Ｐゴシック" pitchFamily="-65" charset="-128"/>
-                <a:cs typeface="ＭＳ Ｐゴシック" pitchFamily="-65" charset="-128"/>
-              </a:rPr>
-              <a:t>The figure here shows the architecture of a typical Inca deployment.  The components inside the gray box indicate the core components of Inca.  So, the way it works is that an administrator for Inca would have a set of monitoring data they want to collect from resources.  The admin would use a GUI client called Incat to generate a configuration (stored in XML) for that monitoring data that contains the names of the tests they want to run, their parameters, execution frequency, and resources.  That configuration is then sent to the agent component which downloads the tests from a repository and stages and launches a client called the reporter manager on each monitored resource.  As each RM runs a test at its scheduled time, the data is stored in a component called the depot where it can be queried and displayed by a data consumer in a web page for example.  </a:t>
-            </a:r>
-          </a:p>
-          <a:p>
-            <a:pPr>
-              <a:buFontTx/>
-              <a:buChar char="•"/>
-            </a:pPr>
-            <a:r>
-              <a:rPr lang="en-US" smtClean="0">
-                <a:latin typeface="Arial" pitchFamily="-65" charset="0"/>
-                <a:ea typeface="ＭＳ Ｐゴシック" pitchFamily="-65" charset="-128"/>
-                <a:cs typeface="ＭＳ Ｐゴシック" pitchFamily="-65" charset="-128"/>
-              </a:rPr>
-              <a:t>Talk a bit more about each component using from the bottom-up.</a:t>
-            </a:r>
-          </a:p>
-          <a:p>
-            <a:pPr eaLnBrk="1" hangingPunct="1"/>
-            <a:endParaRPr lang="en-US" smtClean="0">
+            <a:endParaRPr lang="en-US">
               <a:latin typeface="Arial" pitchFamily="-65" charset="0"/>
               <a:ea typeface="ＭＳ Ｐゴシック" pitchFamily="-65" charset="-128"/>
               <a:cs typeface="ＭＳ Ｐゴシック" pitchFamily="-65" charset="-128"/>
@@ -1742,7 +1619,7 @@
       </p:grpSpPr>
       <p:sp>
         <p:nvSpPr>
-          <p:cNvPr id="30722" name="Rectangle 7"/>
+          <p:cNvPr id="40962" name="Rectangle 7"/>
           <p:cNvSpPr>
             <a:spLocks noGrp="1" noChangeArrowheads="1"/>
           </p:cNvSpPr>
@@ -1757,7 +1634,7 @@
           <a:bodyPr/>
           <a:lstStyle/>
           <a:p>
-            <a:fld id="{532DF2D0-FDD5-7546-9EBA-D1830D2A5D30}" type="slidenum">
+            <a:fld id="{357D2D00-D22D-344E-85CB-1726E637459D}" type="slidenum">
               <a:rPr lang="en-US">
                 <a:latin typeface="Arial" pitchFamily="-65" charset="0"/>
                 <a:ea typeface="ＭＳ Ｐゴシック" pitchFamily="-65" charset="-128"/>
@@ -1776,7 +1653,7 @@
       </p:sp>
       <p:sp>
         <p:nvSpPr>
-          <p:cNvPr id="30723" name="Rectangle 2"/>
+          <p:cNvPr id="40963" name="Rectangle 2"/>
           <p:cNvSpPr>
             <a:spLocks noChangeArrowheads="1"/>
           </p:cNvSpPr>
@@ -1786,8 +1663,8 @@
         </p:nvSpPr>
         <p:spPr>
           <a:xfrm>
-            <a:off x="2228850" y="609600"/>
-            <a:ext cx="2438400" cy="3251200"/>
+            <a:off x="1281113" y="609600"/>
+            <a:ext cx="4333875" cy="3251200"/>
           </a:xfrm>
           <a:solidFill>
             <a:srgbClr val="FFFFFF"/>
@@ -1797,7 +1674,7 @@
       </p:sp>
       <p:sp>
         <p:nvSpPr>
-          <p:cNvPr id="30724" name="Rectangle 3"/>
+          <p:cNvPr id="40964" name="Rectangle 3"/>
           <p:cNvSpPr>
             <a:spLocks noChangeArrowheads="1"/>
           </p:cNvSpPr>
@@ -1823,10 +1700,7 @@
           <a:bodyPr/>
           <a:lstStyle/>
           <a:p>
-            <a:pPr eaLnBrk="1" hangingPunct="1">
-              <a:buFontTx/>
-              <a:buChar char="•"/>
-            </a:pPr>
+            <a:pPr eaLnBrk="1" hangingPunct="1"/>
             <a:endParaRPr lang="en-US">
               <a:latin typeface="Arial" pitchFamily="-65" charset="0"/>
               <a:ea typeface="ＭＳ Ｐゴシック" pitchFamily="-65" charset="-128"/>
@@ -1862,7 +1736,7 @@
       </p:grpSpPr>
       <p:sp>
         <p:nvSpPr>
-          <p:cNvPr id="40962" name="Rectangle 7"/>
+          <p:cNvPr id="45058" name="Rectangle 7"/>
           <p:cNvSpPr>
             <a:spLocks noGrp="1" noChangeArrowheads="1"/>
           </p:cNvSpPr>
@@ -1877,7 +1751,7 @@
           <a:bodyPr/>
           <a:lstStyle/>
           <a:p>
-            <a:fld id="{357D2D00-D22D-344E-85CB-1726E637459D}" type="slidenum">
+            <a:fld id="{45959379-AB53-8F49-9F74-4A790CC272E5}" type="slidenum">
               <a:rPr lang="en-US">
                 <a:latin typeface="Arial" pitchFamily="-65" charset="0"/>
                 <a:ea typeface="ＭＳ Ｐゴシック" pitchFamily="-65" charset="-128"/>
@@ -1896,7 +1770,7 @@
       </p:sp>
       <p:sp>
         <p:nvSpPr>
-          <p:cNvPr id="40963" name="Rectangle 2"/>
+          <p:cNvPr id="45059" name="Rectangle 2"/>
           <p:cNvSpPr>
             <a:spLocks noChangeArrowheads="1"/>
           </p:cNvSpPr>
@@ -1917,7 +1791,7 @@
       </p:sp>
       <p:sp>
         <p:nvSpPr>
-          <p:cNvPr id="40964" name="Rectangle 3"/>
+          <p:cNvPr id="45060" name="Rectangle 3"/>
           <p:cNvSpPr>
             <a:spLocks noChangeArrowheads="1"/>
           </p:cNvSpPr>
@@ -1943,7 +1817,10 @@
           <a:bodyPr/>
           <a:lstStyle/>
           <a:p>
-            <a:pPr eaLnBrk="1" hangingPunct="1"/>
+            <a:pPr eaLnBrk="1" hangingPunct="1">
+              <a:buFontTx/>
+              <a:buChar char="•"/>
+            </a:pPr>
             <a:endParaRPr lang="en-US">
               <a:latin typeface="Arial" pitchFamily="-65" charset="0"/>
               <a:ea typeface="ＭＳ Ｐゴシック" pitchFamily="-65" charset="-128"/>
@@ -1979,7 +1856,7 @@
       </p:grpSpPr>
       <p:sp>
         <p:nvSpPr>
-          <p:cNvPr id="45058" name="Rectangle 7"/>
+          <p:cNvPr id="60418" name="Rectangle 7"/>
           <p:cNvSpPr>
             <a:spLocks noGrp="1" noChangeArrowheads="1"/>
           </p:cNvSpPr>
@@ -1994,7 +1871,7 @@
           <a:bodyPr/>
           <a:lstStyle/>
           <a:p>
-            <a:fld id="{45959379-AB53-8F49-9F74-4A790CC272E5}" type="slidenum">
+            <a:fld id="{2E077A14-C207-8F41-AB9C-6D6AC86C529F}" type="slidenum">
               <a:rPr lang="en-US">
                 <a:latin typeface="Arial" pitchFamily="-65" charset="0"/>
                 <a:ea typeface="ＭＳ Ｐゴシック" pitchFamily="-65" charset="-128"/>
@@ -2013,57 +1890,37 @@
       </p:sp>
       <p:sp>
         <p:nvSpPr>
-          <p:cNvPr id="45059" name="Rectangle 2"/>
+          <p:cNvPr id="60419" name="Rectangle 1026"/>
           <p:cNvSpPr>
-            <a:spLocks noChangeArrowheads="1"/>
+            <a:spLocks noChangeArrowheads="1" noTextEdit="1"/>
           </p:cNvSpPr>
           <p:nvPr>
             <p:ph type="sldImg"/>
           </p:nvPr>
         </p:nvSpPr>
         <p:spPr>
-          <a:xfrm>
-            <a:off x="1281113" y="609600"/>
-            <a:ext cx="4333875" cy="3251200"/>
-          </a:xfrm>
-          <a:solidFill>
-            <a:srgbClr val="FFFFFF"/>
-          </a:solidFill>
           <a:ln/>
         </p:spPr>
       </p:sp>
       <p:sp>
         <p:nvSpPr>
-          <p:cNvPr id="45060" name="Rectangle 3"/>
+          <p:cNvPr id="60420" name="Rectangle 1027"/>
           <p:cNvSpPr>
-            <a:spLocks noChangeArrowheads="1"/>
+            <a:spLocks noGrp="1" noChangeArrowheads="1"/>
           </p:cNvSpPr>
           <p:nvPr>
             <p:ph type="body" idx="1"/>
           </p:nvPr>
         </p:nvSpPr>
         <p:spPr>
-          <a:xfrm>
-            <a:off x="228600" y="3962400"/>
-            <a:ext cx="6515100" cy="4495800"/>
-          </a:xfrm>
-          <a:solidFill>
-            <a:srgbClr val="FFFFFF"/>
-          </a:solidFill>
-          <a:ln>
-            <a:solidFill>
-              <a:srgbClr val="000000"/>
-            </a:solidFill>
-          </a:ln>
+          <a:noFill/>
+          <a:ln/>
         </p:spPr>
         <p:txBody>
           <a:bodyPr/>
           <a:lstStyle/>
           <a:p>
-            <a:pPr eaLnBrk="1" hangingPunct="1">
-              <a:buFontTx/>
-              <a:buChar char="•"/>
-            </a:pPr>
+            <a:pPr eaLnBrk="1" hangingPunct="1"/>
             <a:endParaRPr lang="en-US">
               <a:latin typeface="Arial" pitchFamily="-65" charset="0"/>
               <a:ea typeface="ＭＳ Ｐゴシック" pitchFamily="-65" charset="-128"/>
@@ -2099,7 +1956,7 @@
       </p:grpSpPr>
       <p:sp>
         <p:nvSpPr>
-          <p:cNvPr id="60418" name="Rectangle 7"/>
+          <p:cNvPr id="28674" name="Rectangle 7"/>
           <p:cNvSpPr>
             <a:spLocks noGrp="1" noChangeArrowheads="1"/>
           </p:cNvSpPr>
@@ -2114,14 +1971,14 @@
           <a:bodyPr/>
           <a:lstStyle/>
           <a:p>
-            <a:fld id="{2E077A14-C207-8F41-AB9C-6D6AC86C529F}" type="slidenum">
+            <a:fld id="{B5490588-3AA2-734F-A448-3E4575B1B1ED}" type="slidenum">
               <a:rPr lang="en-US">
                 <a:latin typeface="Arial" pitchFamily="-65" charset="0"/>
                 <a:ea typeface="ＭＳ Ｐゴシック" pitchFamily="-65" charset="-128"/>
                 <a:cs typeface="ＭＳ Ｐゴシック" pitchFamily="-65" charset="-128"/>
               </a:rPr>
               <a:pPr/>
-              <a:t>9</a:t>
+              <a:t>11</a:t>
             </a:fld>
             <a:endParaRPr lang="en-US">
               <a:latin typeface="Arial" pitchFamily="-65" charset="0"/>
@@ -2133,31 +1990,40 @@
       </p:sp>
       <p:sp>
         <p:nvSpPr>
-          <p:cNvPr id="60419" name="Rectangle 1026"/>
+          <p:cNvPr id="28675" name="Rectangle 2"/>
           <p:cNvSpPr>
-            <a:spLocks noChangeArrowheads="1" noTextEdit="1"/>
+            <a:spLocks noChangeArrowheads="1"/>
           </p:cNvSpPr>
           <p:nvPr>
             <p:ph type="sldImg"/>
           </p:nvPr>
         </p:nvSpPr>
         <p:spPr>
+          <a:solidFill>
+            <a:srgbClr val="FFFFFF"/>
+          </a:solidFill>
           <a:ln/>
         </p:spPr>
       </p:sp>
       <p:sp>
         <p:nvSpPr>
-          <p:cNvPr id="60420" name="Rectangle 1027"/>
+          <p:cNvPr id="28676" name="Rectangle 3"/>
           <p:cNvSpPr>
-            <a:spLocks noGrp="1" noChangeArrowheads="1"/>
+            <a:spLocks noChangeArrowheads="1"/>
           </p:cNvSpPr>
           <p:nvPr>
             <p:ph type="body" idx="1"/>
           </p:nvPr>
         </p:nvSpPr>
         <p:spPr>
-          <a:noFill/>
-          <a:ln/>
+          <a:solidFill>
+            <a:srgbClr val="FFFFFF"/>
+          </a:solidFill>
+          <a:ln>
+            <a:solidFill>
+              <a:srgbClr val="000000"/>
+            </a:solidFill>
+          </a:ln>
         </p:spPr>
         <p:txBody>
           <a:bodyPr/>
@@ -2199,7 +2065,7 @@
       </p:grpSpPr>
       <p:sp>
         <p:nvSpPr>
-          <p:cNvPr id="28674" name="Rectangle 7"/>
+          <p:cNvPr id="22530" name="Rectangle 7"/>
           <p:cNvSpPr>
             <a:spLocks noGrp="1" noChangeArrowheads="1"/>
           </p:cNvSpPr>
@@ -2214,14 +2080,14 @@
           <a:bodyPr/>
           <a:lstStyle/>
           <a:p>
-            <a:fld id="{B5490588-3AA2-734F-A448-3E4575B1B1ED}" type="slidenum">
+            <a:fld id="{9718FB86-B29B-224C-B84C-67881F2A305E}" type="slidenum">
               <a:rPr lang="en-US">
                 <a:latin typeface="Arial" pitchFamily="-65" charset="0"/>
                 <a:ea typeface="ＭＳ Ｐゴシック" pitchFamily="-65" charset="-128"/>
                 <a:cs typeface="ＭＳ Ｐゴシック" pitchFamily="-65" charset="-128"/>
               </a:rPr>
               <a:pPr/>
-              <a:t>13</a:t>
+              <a:t>12</a:t>
             </a:fld>
             <a:endParaRPr lang="en-US">
               <a:latin typeface="Arial" pitchFamily="-65" charset="0"/>
@@ -2233,51 +2099,45 @@
       </p:sp>
       <p:sp>
         <p:nvSpPr>
-          <p:cNvPr id="28675" name="Rectangle 2"/>
+          <p:cNvPr id="22531" name="Rectangle 2"/>
           <p:cNvSpPr>
-            <a:spLocks noChangeArrowheads="1"/>
+            <a:spLocks noChangeArrowheads="1" noTextEdit="1"/>
           </p:cNvSpPr>
           <p:nvPr>
             <p:ph type="sldImg"/>
           </p:nvPr>
         </p:nvSpPr>
         <p:spPr>
-          <a:solidFill>
-            <a:srgbClr val="FFFFFF"/>
-          </a:solidFill>
           <a:ln/>
         </p:spPr>
       </p:sp>
       <p:sp>
         <p:nvSpPr>
-          <p:cNvPr id="28676" name="Rectangle 3"/>
+          <p:cNvPr id="22532" name="Rectangle 3"/>
           <p:cNvSpPr>
-            <a:spLocks noChangeArrowheads="1"/>
+            <a:spLocks noGrp="1" noChangeArrowheads="1"/>
           </p:cNvSpPr>
           <p:nvPr>
             <p:ph type="body" idx="1"/>
           </p:nvPr>
         </p:nvSpPr>
         <p:spPr>
-          <a:solidFill>
-            <a:srgbClr val="FFFFFF"/>
-          </a:solidFill>
-          <a:ln>
-            <a:solidFill>
-              <a:srgbClr val="000000"/>
-            </a:solidFill>
-          </a:ln>
+          <a:noFill/>
+          <a:ln/>
         </p:spPr>
         <p:txBody>
           <a:bodyPr/>
           <a:lstStyle/>
           <a:p>
             <a:pPr eaLnBrk="1" hangingPunct="1"/>
-            <a:endParaRPr lang="en-US">
-              <a:latin typeface="Arial" pitchFamily="-65" charset="0"/>
-              <a:ea typeface="ＭＳ Ｐゴシック" pitchFamily="-65" charset="-128"/>
-              <a:cs typeface="ＭＳ Ｐゴシック" pitchFamily="-65" charset="-128"/>
-            </a:endParaRPr>
+            <a:r>
+              <a:rPr lang="en-US" smtClean="0">
+                <a:latin typeface="Arial" pitchFamily="-65" charset="0"/>
+                <a:ea typeface="ＭＳ Ｐゴシック" pitchFamily="-65" charset="-128"/>
+                <a:cs typeface="ＭＳ Ｐゴシック" pitchFamily="-65" charset="-128"/>
+              </a:rPr>
+              <a:t>There weren’t any Grid monitoring systems when we started Inca but today here is a sampling of the most common onethat have either been developed or adapted to do Grid monitoring. One key difference is Inca’s ability to collect a wide variety of monitoring data from functionality to performance data.   But the main difference between Inca and these other tools is our the method of monitoring.  A lot of these tools focus on aggregating each site’s system-level monitoring data such such as queue information while we focus on emulating a user’s experience.</a:t>
+            </a:r>
           </a:p>
         </p:txBody>
       </p:sp>
@@ -5153,268 +5013,81 @@
             <p:ph type="title"/>
           </p:nvPr>
         </p:nvSpPr>
+        <p:spPr>
+          <a:xfrm>
+            <a:off x="228600" y="381000"/>
+            <a:ext cx="8763000" cy="1041400"/>
+          </a:xfrm>
+        </p:spPr>
+        <p:txBody>
+          <a:bodyPr/>
+          <a:lstStyle/>
+          <a:p>
+            <a:r>
+              <a:rPr lang="en-US" dirty="0" smtClean="0"/>
+              <a:t>Discussion: possibilities for expanding monitoring</a:t>
+            </a:r>
+            <a:endParaRPr lang="en-US" dirty="0"/>
+          </a:p>
+        </p:txBody>
+      </p:sp>
+      <p:sp>
+        <p:nvSpPr>
+          <p:cNvPr id="3" name="Content Placeholder 2"/>
+          <p:cNvSpPr>
+            <a:spLocks noGrp="1"/>
+          </p:cNvSpPr>
+          <p:nvPr>
+            <p:ph idx="1"/>
+          </p:nvPr>
+        </p:nvSpPr>
         <p:spPr/>
         <p:txBody>
           <a:bodyPr/>
           <a:lstStyle/>
           <a:p>
+            <a:endParaRPr lang="en-US" dirty="0" smtClean="0"/>
+          </a:p>
+          <a:p>
             <a:r>
               <a:rPr lang="en-US" dirty="0" smtClean="0"/>
-              <a:t>Monitoring </a:t>
-            </a:r>
-            <a:r>
-              <a:rPr lang="en-US" dirty="0" err="1" smtClean="0"/>
-              <a:t>UCSD’s</a:t>
-            </a:r>
+              <a:t>What other services should be monitored?</a:t>
+            </a:r>
+          </a:p>
+          <a:p>
+            <a:endParaRPr lang="en-US" dirty="0" smtClean="0"/>
+          </a:p>
+          <a:p>
+            <a:endParaRPr lang="en-US" dirty="0" smtClean="0"/>
+          </a:p>
+          <a:p>
+            <a:endParaRPr lang="en-US" dirty="0" smtClean="0"/>
+          </a:p>
+          <a:p>
             <a:r>
               <a:rPr lang="en-US" dirty="0" smtClean="0"/>
-              <a:t> campus portal</a:t>
-            </a:r>
-            <a:endParaRPr lang="en-US" dirty="0"/>
-          </a:p>
-        </p:txBody>
-      </p:sp>
-      <p:sp>
-        <p:nvSpPr>
-          <p:cNvPr id="3" name="Content Placeholder 2"/>
-          <p:cNvSpPr>
-            <a:spLocks noGrp="1"/>
-          </p:cNvSpPr>
-          <p:nvPr>
-            <p:ph idx="1"/>
-          </p:nvPr>
-        </p:nvSpPr>
-        <p:spPr>
-          <a:xfrm>
-            <a:off x="228600" y="1422400"/>
-            <a:ext cx="8458200" cy="4749800"/>
-          </a:xfrm>
-        </p:spPr>
-        <p:txBody>
-          <a:bodyPr/>
-          <a:lstStyle/>
-          <a:p>
-            <a:r>
-              <a:rPr lang="en-US" dirty="0" smtClean="0"/>
-              <a:t>At first glance: (remote tests)</a:t>
-            </a:r>
-          </a:p>
-          <a:p>
-            <a:endParaRPr lang="en-US" dirty="0" smtClean="0"/>
-          </a:p>
-          <a:p>
-            <a:pPr lvl="1"/>
-            <a:r>
-              <a:rPr lang="en-US" dirty="0" smtClean="0"/>
-              <a:t>Tomcat/</a:t>
-            </a:r>
-            <a:r>
-              <a:rPr lang="en-US" dirty="0" err="1" smtClean="0"/>
-              <a:t>Gridsphere</a:t>
-            </a:r>
-            <a:endParaRPr lang="en-US" dirty="0" smtClean="0"/>
-          </a:p>
-          <a:p>
-            <a:pPr lvl="1"/>
-            <a:endParaRPr lang="en-US" dirty="0" smtClean="0"/>
-          </a:p>
-          <a:p>
-            <a:pPr lvl="1"/>
-            <a:r>
-              <a:rPr lang="en-US" dirty="0" err="1" smtClean="0"/>
-              <a:t>MyProxy</a:t>
-            </a:r>
-            <a:endParaRPr lang="en-US" dirty="0" smtClean="0"/>
-          </a:p>
-          <a:p>
-            <a:pPr lvl="1">
+              <a:t>Expand to more campuses?</a:t>
+            </a:r>
+          </a:p>
+          <a:p>
+            <a:pPr>
               <a:buNone/>
             </a:pPr>
             <a:endParaRPr lang="en-US" dirty="0" smtClean="0"/>
           </a:p>
           <a:p>
-            <a:pPr lvl="1"/>
-            <a:r>
-              <a:rPr lang="en-US" dirty="0" smtClean="0"/>
-              <a:t>MDS</a:t>
-            </a:r>
-          </a:p>
-          <a:p>
-            <a:pPr lvl="1"/>
-            <a:endParaRPr lang="en-US" dirty="0" smtClean="0"/>
-          </a:p>
-          <a:p>
-            <a:pPr lvl="1"/>
-            <a:r>
-              <a:rPr lang="en-US" dirty="0" smtClean="0"/>
-              <a:t>WS-GRAM</a:t>
-            </a:r>
-          </a:p>
-          <a:p>
-            <a:pPr lvl="1">
+            <a:pPr>
               <a:buNone/>
             </a:pPr>
             <a:endParaRPr lang="en-US" dirty="0"/>
           </a:p>
         </p:txBody>
       </p:sp>
-      <p:pic>
-        <p:nvPicPr>
-          <p:cNvPr id="6" name="Picture 5" descr="ScreenSnapz.png"/>
-          <p:cNvPicPr>
-            <a:picLocks noChangeAspect="1"/>
-          </p:cNvPicPr>
-          <p:nvPr/>
-        </p:nvPicPr>
-        <p:blipFill>
-          <a:blip r:embed="rId2"/>
-          <a:stretch>
-            <a:fillRect/>
-          </a:stretch>
-        </p:blipFill>
-        <p:spPr>
-          <a:xfrm>
-            <a:off x="5385232" y="1295400"/>
-            <a:ext cx="3225368" cy="4719472"/>
-          </a:xfrm>
-          <a:prstGeom prst="rect">
-            <a:avLst/>
-          </a:prstGeom>
-          <a:ln>
-            <a:solidFill>
-              <a:schemeClr val="tx1"/>
-            </a:solidFill>
-          </a:ln>
-        </p:spPr>
-      </p:pic>
-      <p:cxnSp>
-        <p:nvCxnSpPr>
-          <p:cNvPr id="8" name="Straight Arrow Connector 7"/>
-          <p:cNvCxnSpPr/>
-          <p:nvPr/>
-        </p:nvCxnSpPr>
-        <p:spPr bwMode="auto">
-          <a:xfrm>
-            <a:off x="3962400" y="2667000"/>
-            <a:ext cx="1371600" cy="228600"/>
-          </a:xfrm>
-          <a:prstGeom prst="straightConnector1">
-            <a:avLst/>
-          </a:prstGeom>
-          <a:solidFill>
-            <a:schemeClr val="accent1"/>
-          </a:solidFill>
-          <a:ln w="9525" cap="flat" cmpd="sng" algn="ctr">
-            <a:solidFill>
-              <a:schemeClr val="tx1"/>
-            </a:solidFill>
-            <a:prstDash val="solid"/>
-            <a:round/>
-            <a:headEnd type="none" w="med" len="med"/>
-            <a:tailEnd type="arrow"/>
-          </a:ln>
-          <a:effectLst/>
-        </p:spPr>
-      </p:cxnSp>
-      <p:cxnSp>
-        <p:nvCxnSpPr>
-          <p:cNvPr id="9" name="Straight Arrow Connector 8"/>
-          <p:cNvCxnSpPr/>
-          <p:nvPr/>
-        </p:nvCxnSpPr>
-        <p:spPr bwMode="auto">
-          <a:xfrm flipV="1">
-            <a:off x="2438400" y="3276600"/>
-            <a:ext cx="2895600" cy="228600"/>
-          </a:xfrm>
-          <a:prstGeom prst="straightConnector1">
-            <a:avLst/>
-          </a:prstGeom>
-          <a:solidFill>
-            <a:schemeClr val="accent1"/>
-          </a:solidFill>
-          <a:ln w="9525" cap="flat" cmpd="sng" algn="ctr">
-            <a:solidFill>
-              <a:schemeClr val="tx1"/>
-            </a:solidFill>
-            <a:prstDash val="solid"/>
-            <a:round/>
-            <a:headEnd type="none" w="med" len="med"/>
-            <a:tailEnd type="arrow"/>
-          </a:ln>
-          <a:effectLst/>
-        </p:spPr>
-      </p:cxnSp>
-      <p:cxnSp>
-        <p:nvCxnSpPr>
-          <p:cNvPr id="13" name="Straight Arrow Connector 12"/>
-          <p:cNvCxnSpPr/>
-          <p:nvPr/>
-        </p:nvCxnSpPr>
-        <p:spPr bwMode="auto">
-          <a:xfrm>
-            <a:off x="2819400" y="5257800"/>
-            <a:ext cx="2514600" cy="76200"/>
-          </a:xfrm>
-          <a:prstGeom prst="straightConnector1">
-            <a:avLst/>
-          </a:prstGeom>
-          <a:solidFill>
-            <a:schemeClr val="accent1"/>
-          </a:solidFill>
-          <a:ln w="9525" cap="flat" cmpd="sng" algn="ctr">
-            <a:solidFill>
-              <a:schemeClr val="tx1"/>
-            </a:solidFill>
-            <a:prstDash val="solid"/>
-            <a:round/>
-            <a:headEnd type="none" w="med" len="med"/>
-            <a:tailEnd type="arrow"/>
-          </a:ln>
-          <a:effectLst/>
-        </p:spPr>
-      </p:cxnSp>
-      <p:cxnSp>
-        <p:nvCxnSpPr>
-          <p:cNvPr id="16" name="Straight Arrow Connector 15"/>
-          <p:cNvCxnSpPr/>
-          <p:nvPr/>
-        </p:nvCxnSpPr>
-        <p:spPr bwMode="auto">
-          <a:xfrm>
-            <a:off x="1981200" y="4343400"/>
-            <a:ext cx="3352800" cy="762000"/>
-          </a:xfrm>
-          <a:prstGeom prst="straightConnector1">
-            <a:avLst/>
-          </a:prstGeom>
-          <a:solidFill>
-            <a:schemeClr val="accent1"/>
-          </a:solidFill>
-          <a:ln w="9525" cap="flat" cmpd="sng" algn="ctr">
-            <a:solidFill>
-              <a:schemeClr val="tx1"/>
-            </a:solidFill>
-            <a:prstDash val="solid"/>
-            <a:round/>
-            <a:headEnd type="none" w="med" len="med"/>
-            <a:tailEnd type="arrow"/>
-          </a:ln>
-          <a:effectLst/>
-        </p:spPr>
-      </p:cxnSp>
     </p:spTree>
   </p:cSld>
   <p:clrMapOvr>
     <a:masterClrMapping/>
   </p:clrMapOvr>
-  <p:timing>
-    <p:tnLst>
-      <p:par>
-        <p:cTn id="1" dur="indefinite" restart="never" nodeType="tmRoot"/>
-      </p:par>
-    </p:tnLst>
-  </p:timing>
 </p:sld>
 </file>
 
@@ -5437,174 +5110,6 @@
       </p:grpSpPr>
       <p:sp>
         <p:nvSpPr>
-          <p:cNvPr id="2" name="Title 1"/>
-          <p:cNvSpPr>
-            <a:spLocks noGrp="1"/>
-          </p:cNvSpPr>
-          <p:nvPr>
-            <p:ph type="title"/>
-          </p:nvPr>
-        </p:nvSpPr>
-        <p:spPr>
-          <a:xfrm>
-            <a:off x="228600" y="381000"/>
-            <a:ext cx="8763000" cy="1041400"/>
-          </a:xfrm>
-        </p:spPr>
-        <p:txBody>
-          <a:bodyPr/>
-          <a:lstStyle/>
-          <a:p>
-            <a:r>
-              <a:rPr lang="en-US" dirty="0" smtClean="0"/>
-              <a:t>Possibilities for expanding monitoring</a:t>
-            </a:r>
-            <a:endParaRPr lang="en-US" dirty="0"/>
-          </a:p>
-        </p:txBody>
-      </p:sp>
-      <p:sp>
-        <p:nvSpPr>
-          <p:cNvPr id="3" name="Content Placeholder 2"/>
-          <p:cNvSpPr>
-            <a:spLocks noGrp="1"/>
-          </p:cNvSpPr>
-          <p:nvPr>
-            <p:ph idx="1"/>
-          </p:nvPr>
-        </p:nvSpPr>
-        <p:spPr/>
-        <p:txBody>
-          <a:bodyPr/>
-          <a:lstStyle/>
-          <a:p>
-            <a:endParaRPr lang="en-US" dirty="0" smtClean="0"/>
-          </a:p>
-          <a:p>
-            <a:r>
-              <a:rPr lang="en-US" dirty="0" smtClean="0"/>
-              <a:t>What other services should be monitored?</a:t>
-            </a:r>
-          </a:p>
-          <a:p>
-            <a:endParaRPr lang="en-US" dirty="0" smtClean="0"/>
-          </a:p>
-          <a:p>
-            <a:endParaRPr lang="en-US" dirty="0" smtClean="0"/>
-          </a:p>
-          <a:p>
-            <a:endParaRPr lang="en-US" dirty="0" smtClean="0"/>
-          </a:p>
-          <a:p>
-            <a:r>
-              <a:rPr lang="en-US" dirty="0" smtClean="0"/>
-              <a:t>Expand to more campuses?</a:t>
-            </a:r>
-          </a:p>
-          <a:p>
-            <a:pPr>
-              <a:buNone/>
-            </a:pPr>
-            <a:endParaRPr lang="en-US" dirty="0" smtClean="0"/>
-          </a:p>
-          <a:p>
-            <a:pPr>
-              <a:buNone/>
-            </a:pPr>
-            <a:endParaRPr lang="en-US" dirty="0"/>
-          </a:p>
-        </p:txBody>
-      </p:sp>
-    </p:spTree>
-  </p:cSld>
-  <p:clrMapOvr>
-    <a:masterClrMapping/>
-  </p:clrMapOvr>
-</p:sld>
-</file>
-
-<file path=ppt/slides/slide12.xml><?xml version="1.0" encoding="utf-8"?>
-<p:sld xmlns:a="http://schemas.openxmlformats.org/drawingml/2006/main" xmlns:r="http://schemas.openxmlformats.org/officeDocument/2006/relationships" xmlns:mc="http://schemas.openxmlformats.org/markup-compatibility/2006" xmlns:mv="urn:schemas-microsoft-com:mac:vml" xmlns:p="http://schemas.openxmlformats.org/presentationml/2006/main" mc:Ignorable="mv" mc:PreserveAttributes="mv:*">
-  <p:cSld>
-    <p:spTree>
-      <p:nvGrpSpPr>
-        <p:cNvPr id="1" name=""/>
-        <p:cNvGrpSpPr/>
-        <p:nvPr/>
-      </p:nvGrpSpPr>
-      <p:grpSpPr>
-        <a:xfrm>
-          <a:off x="0" y="0"/>
-          <a:ext cx="0" cy="0"/>
-          <a:chOff x="0" y="0"/>
-          <a:chExt cx="0" cy="0"/>
-        </a:xfrm>
-      </p:grpSpPr>
-      <p:sp>
-        <p:nvSpPr>
-          <p:cNvPr id="2" name="Title 1"/>
-          <p:cNvSpPr>
-            <a:spLocks noGrp="1"/>
-          </p:cNvSpPr>
-          <p:nvPr>
-            <p:ph type="title"/>
-          </p:nvPr>
-        </p:nvSpPr>
-        <p:spPr/>
-        <p:txBody>
-          <a:bodyPr/>
-          <a:lstStyle/>
-          <a:p>
-            <a:endParaRPr lang="en-US"/>
-          </a:p>
-        </p:txBody>
-      </p:sp>
-      <p:sp>
-        <p:nvSpPr>
-          <p:cNvPr id="3" name="Content Placeholder 2"/>
-          <p:cNvSpPr>
-            <a:spLocks noGrp="1"/>
-          </p:cNvSpPr>
-          <p:nvPr>
-            <p:ph idx="1"/>
-          </p:nvPr>
-        </p:nvSpPr>
-        <p:spPr/>
-        <p:txBody>
-          <a:bodyPr/>
-          <a:lstStyle/>
-          <a:p>
-            <a:endParaRPr lang="en-US"/>
-          </a:p>
-        </p:txBody>
-      </p:sp>
-    </p:spTree>
-  </p:cSld>
-  <p:clrMapOvr>
-    <a:masterClrMapping/>
-  </p:clrMapOvr>
-</p:sld>
-</file>
-
-<file path=ppt/slides/slide13.xml><?xml version="1.0" encoding="utf-8"?>
-<p:sld xmlns:a="http://schemas.openxmlformats.org/drawingml/2006/main" xmlns:r="http://schemas.openxmlformats.org/officeDocument/2006/relationships" xmlns:mc="http://schemas.openxmlformats.org/markup-compatibility/2006" xmlns:mv="urn:schemas-microsoft-com:mac:vml" xmlns:p="http://schemas.openxmlformats.org/presentationml/2006/main" mc:Ignorable="mv" mc:PreserveAttributes="mv:*">
-  <p:cSld>
-    <p:spTree>
-      <p:nvGrpSpPr>
-        <p:cNvPr id="1" name=""/>
-        <p:cNvGrpSpPr/>
-        <p:nvPr/>
-      </p:nvGrpSpPr>
-      <p:grpSpPr>
-        <a:xfrm>
-          <a:off x="0" y="0"/>
-          <a:ext cx="0" cy="0"/>
-          <a:chOff x="0" y="0"/>
-          <a:chExt cx="0" cy="0"/>
-        </a:xfrm>
-      </p:grpSpPr>
-      <p:sp>
-        <p:nvSpPr>
           <p:cNvPr id="27650" name="Rectangle 12"/>
           <p:cNvSpPr>
             <a:spLocks noGrp="1" noChangeArrowheads="1"/>
@@ -5868,7 +5373,7 @@
 </p:sld>
 </file>
 
-<file path=ppt/slides/slide14.xml><?xml version="1.0" encoding="utf-8"?>
+<file path=ppt/slides/slide12.xml><?xml version="1.0" encoding="utf-8"?>
 <p:sld xmlns:a="http://schemas.openxmlformats.org/drawingml/2006/main" xmlns:r="http://schemas.openxmlformats.org/officeDocument/2006/relationships" xmlns:mc="http://schemas.openxmlformats.org/markup-compatibility/2006" xmlns:mv="urn:schemas-microsoft-com:mac:vml" xmlns:p="http://schemas.openxmlformats.org/presentationml/2006/main" mc:Ignorable="mv" mc:PreserveAttributes="mv:*">
   <p:cSld>
     <p:spTree>
@@ -6466,120 +5971,16 @@
       </p:grpSpPr>
       <p:sp>
         <p:nvSpPr>
-          <p:cNvPr id="19459" name="Rectangle 3"/>
+          <p:cNvPr id="21506" name="Rectangle 10"/>
           <p:cNvSpPr>
-            <a:spLocks noGrp="1" noChangeArrowheads="1"/>
-          </p:cNvSpPr>
-          <p:nvPr>
-            <p:ph type="title"/>
-          </p:nvPr>
-        </p:nvSpPr>
-        <p:spPr>
-          <a:xfrm>
-            <a:off x="228600" y="381000"/>
-            <a:ext cx="8839200" cy="1041400"/>
-          </a:xfrm>
-        </p:spPr>
-        <p:txBody>
-          <a:bodyPr/>
-          <a:lstStyle/>
-          <a:p>
-            <a:r>
-              <a:rPr lang="en-GB" sz="2800">
-                <a:solidFill>
-                  <a:srgbClr val="0E1ECC"/>
-                </a:solidFill>
-                <a:latin typeface="Arial" pitchFamily="-65" charset="0"/>
-                <a:ea typeface="ＭＳ Ｐゴシック" pitchFamily="-65" charset="-128"/>
-              </a:rPr>
-              <a:t>Goal: reliable grid software and services for users</a:t>
-            </a:r>
-            <a:endParaRPr lang="en-US" sz="3200">
-              <a:latin typeface="Arial" pitchFamily="-65" charset="0"/>
-              <a:ea typeface="ＭＳ Ｐゴシック" pitchFamily="-65" charset="-128"/>
-            </a:endParaRPr>
-          </a:p>
-        </p:txBody>
-      </p:sp>
-      <p:sp>
-        <p:nvSpPr>
-          <p:cNvPr id="19460" name="Text Placeholder 8"/>
-          <p:cNvSpPr>
-            <a:spLocks noGrp="1"/>
-          </p:cNvSpPr>
-          <p:nvPr>
-            <p:ph type="body" sz="half" idx="1"/>
-          </p:nvPr>
-        </p:nvSpPr>
-        <p:spPr>
-          <a:xfrm>
-            <a:off x="381000" y="1447800"/>
-            <a:ext cx="3048000" cy="4267200"/>
-          </a:xfrm>
-        </p:spPr>
-        <p:txBody>
-          <a:bodyPr/>
-          <a:lstStyle/>
-          <a:p>
-            <a:r>
-              <a:rPr lang="en-US" sz="2400" smtClean="0">
-                <a:latin typeface="Arial" pitchFamily="-65" charset="0"/>
-                <a:ea typeface="ＭＳ Ｐゴシック" pitchFamily="-65" charset="-128"/>
-              </a:rPr>
-              <a:t>Grids provide unified access to resources that advance scientific exploration</a:t>
-            </a:r>
-          </a:p>
-          <a:p>
-            <a:endParaRPr lang="en-US" sz="2400" smtClean="0">
-              <a:latin typeface="Arial" pitchFamily="-65" charset="0"/>
-              <a:ea typeface="ＭＳ Ｐゴシック" pitchFamily="-65" charset="-128"/>
-            </a:endParaRPr>
-          </a:p>
-          <a:p>
-            <a:r>
-              <a:rPr lang="en-US" sz="2400" smtClean="0">
-                <a:latin typeface="Arial" pitchFamily="-65" charset="0"/>
-                <a:ea typeface="ＭＳ Ｐゴシック" pitchFamily="-65" charset="-128"/>
-              </a:rPr>
-              <a:t>Unfortunately, complex to deploy and maintain</a:t>
-            </a:r>
-          </a:p>
-          <a:p>
-            <a:endParaRPr lang="en-US" sz="2400" smtClean="0">
-              <a:latin typeface="Arial" pitchFamily="-65" charset="0"/>
-              <a:ea typeface="ＭＳ Ｐゴシック" pitchFamily="-65" charset="-128"/>
-            </a:endParaRPr>
-          </a:p>
-          <a:p>
-            <a:r>
-              <a:rPr lang="en-US" sz="2400" smtClean="0">
-                <a:latin typeface="Arial" pitchFamily="-65" charset="0"/>
-                <a:ea typeface="ＭＳ Ｐゴシック" pitchFamily="-65" charset="-128"/>
-              </a:rPr>
-              <a:t>Detect and analyze failures</a:t>
-            </a:r>
-          </a:p>
-        </p:txBody>
-      </p:sp>
-      <p:pic>
-        <p:nvPicPr>
-          <p:cNvPr id="19461" name="Picture 4" descr="tg_logo"/>
-          <p:cNvPicPr>
-            <a:picLocks noChangeAspect="1" noChangeArrowheads="1"/>
-          </p:cNvPicPr>
+            <a:spLocks noChangeArrowheads="1"/>
+          </p:cNvSpPr>
           <p:nvPr/>
-        </p:nvPicPr>
-        <p:blipFill>
-          <a:blip r:embed="rId4"/>
-          <a:srcRect/>
-          <a:stretch>
-            <a:fillRect/>
-          </a:stretch>
-        </p:blipFill>
+        </p:nvSpPr>
         <p:spPr bwMode="auto">
           <a:xfrm>
-            <a:off x="4038600" y="1676400"/>
-            <a:ext cx="941388" cy="1012825"/>
+            <a:off x="5562600" y="3232150"/>
+            <a:ext cx="1779588" cy="730250"/>
           </a:xfrm>
           <a:prstGeom prst="rect">
             <a:avLst/>
@@ -6592,33 +5993,8 @@
             <a:tailEnd/>
           </a:ln>
         </p:spPr>
-      </p:pic>
-      <p:sp>
-        <p:nvSpPr>
-          <p:cNvPr id="19462" name="Rectangle 5"/>
-          <p:cNvSpPr>
-            <a:spLocks noChangeArrowheads="1"/>
-          </p:cNvSpPr>
-          <p:nvPr/>
-        </p:nvSpPr>
-        <p:spPr bwMode="auto">
-          <a:xfrm>
-            <a:off x="4495800" y="4876800"/>
-            <a:ext cx="5181600" cy="1016000"/>
-          </a:xfrm>
-          <a:prstGeom prst="rect">
-            <a:avLst/>
-          </a:prstGeom>
-          <a:noFill/>
-          <a:ln w="9525">
-            <a:noFill/>
-            <a:miter lim="800000"/>
-            <a:headEnd/>
-            <a:tailEnd/>
-          </a:ln>
-        </p:spPr>
         <p:txBody>
-          <a:bodyPr>
+          <a:bodyPr wrap="none">
             <a:prstTxWarp prst="textNoShape">
               <a:avLst/>
             </a:prstTxWarp>
@@ -6626,73 +6002,233 @@
           </a:bodyPr>
           <a:lstStyle/>
           <a:p>
-            <a:r>
-              <a:rPr lang="en-GB" i="1">
-                <a:solidFill>
-                  <a:schemeClr val="accent2"/>
-                </a:solidFill>
-                <a:latin typeface="Times New Roman" pitchFamily="-65" charset="0"/>
+            <a:pPr algn="ctr">
+              <a:lnSpc>
+                <a:spcPct val="95000"/>
+              </a:lnSpc>
+              <a:spcBef>
+                <a:spcPct val="20000"/>
+              </a:spcBef>
+              <a:buClr>
+                <a:schemeClr val="tx1"/>
+              </a:buClr>
+              <a:buSzPct val="100000"/>
+            </a:pPr>
+            <a:r>
+              <a:rPr lang="en-US">
+                <a:latin typeface="Helvetica" pitchFamily="-65" charset="0"/>
               </a:rPr>
-              <a:t>1+ PFlop compute power, </a:t>
-            </a:r>
-          </a:p>
-          <a:p>
-            <a:r>
-              <a:rPr lang="en-GB" i="1">
-                <a:solidFill>
-                  <a:schemeClr val="accent2"/>
-                </a:solidFill>
-                <a:latin typeface="Times New Roman" pitchFamily="-65" charset="0"/>
+              <a:t>System</a:t>
+            </a:r>
+          </a:p>
+          <a:p>
+            <a:pPr algn="ctr">
+              <a:lnSpc>
+                <a:spcPct val="95000"/>
+              </a:lnSpc>
+              <a:spcBef>
+                <a:spcPct val="20000"/>
+              </a:spcBef>
+              <a:buClr>
+                <a:schemeClr val="tx1"/>
+              </a:buClr>
+              <a:buSzPct val="100000"/>
+            </a:pPr>
+            <a:r>
+              <a:rPr lang="en-US">
+                <a:latin typeface="Helvetica" pitchFamily="-65" charset="0"/>
               </a:rPr>
-              <a:t>30+ PB of online and archival data storage, </a:t>
-            </a:r>
-          </a:p>
-          <a:p>
-            <a:r>
-              <a:rPr lang="en-GB" i="1">
-                <a:solidFill>
-                  <a:schemeClr val="accent2"/>
-                </a:solidFill>
-                <a:latin typeface="Times New Roman" pitchFamily="-65" charset="0"/>
+              <a:t>administrators</a:t>
+            </a:r>
+            <a:endParaRPr lang="en-US" sz="1800">
+              <a:latin typeface="Helvetica" pitchFamily="-65" charset="0"/>
+            </a:endParaRPr>
+          </a:p>
+        </p:txBody>
+      </p:sp>
+      <p:sp>
+        <p:nvSpPr>
+          <p:cNvPr id="21507" name="Rectangle 18"/>
+          <p:cNvSpPr>
+            <a:spLocks noGrp="1" noChangeArrowheads="1"/>
+          </p:cNvSpPr>
+          <p:nvPr>
+            <p:ph type="title"/>
+          </p:nvPr>
+        </p:nvSpPr>
+        <p:spPr>
+          <a:xfrm>
+            <a:off x="0" y="228600"/>
+            <a:ext cx="9144000" cy="1041400"/>
+          </a:xfrm>
+        </p:spPr>
+        <p:txBody>
+          <a:bodyPr/>
+          <a:lstStyle/>
+          <a:p>
+            <a:r>
+              <a:rPr lang="en-US" sz="3400">
+                <a:latin typeface="Arial" pitchFamily="-65" charset="0"/>
+                <a:ea typeface="ＭＳ Ｐゴシック" pitchFamily="-65" charset="-128"/>
               </a:rPr>
-              <a:t>multi-Gpbs links  </a:t>
-            </a:r>
-            <a:endParaRPr lang="en-US" sz="2400">
-              <a:latin typeface="Times New Roman" pitchFamily="-65" charset="0"/>
-            </a:endParaRPr>
+              <a:t>Who benefits from grid monitoring?</a:t>
+            </a:r>
           </a:p>
         </p:txBody>
       </p:sp>
-      <p:graphicFrame>
-        <p:nvGraphicFramePr>
-          <p:cNvPr id="19458" name="Object 2"/>
-          <p:cNvGraphicFramePr>
-            <a:graphicFrameLocks noChangeAspect="1"/>
-          </p:cNvGraphicFramePr>
-          <p:nvPr/>
-        </p:nvGraphicFramePr>
-        <p:xfrm>
-          <a:off x="3505200" y="1497013"/>
-          <a:ext cx="5257800" cy="3224212"/>
-        </p:xfrm>
-        <a:graphic>
-          <a:graphicData uri="http://schemas.openxmlformats.org/presentationml/2006/ole">
-            <p:oleObj spid="_x0000_s19458" name="Document" r:id="rId5" imgW="4093464" imgH="2676144" progId="Word.Document.8">
-              <p:embed/>
-            </p:oleObj>
-          </a:graphicData>
-        </a:graphic>
-      </p:graphicFrame>
+      <p:sp>
+        <p:nvSpPr>
+          <p:cNvPr id="21508" name="Rectangle 19"/>
+          <p:cNvSpPr>
+            <a:spLocks noGrp="1" noChangeArrowheads="1"/>
+          </p:cNvSpPr>
+          <p:nvPr>
+            <p:ph type="body" idx="1"/>
+          </p:nvPr>
+        </p:nvSpPr>
+        <p:spPr>
+          <a:xfrm>
+            <a:off x="381000" y="1422400"/>
+            <a:ext cx="4419600" cy="4749800"/>
+          </a:xfrm>
+        </p:spPr>
+        <p:txBody>
+          <a:bodyPr/>
+          <a:lstStyle/>
+          <a:p>
+            <a:r>
+              <a:rPr lang="en-US" sz="2400">
+                <a:latin typeface="Arial" pitchFamily="-65" charset="0"/>
+                <a:ea typeface="ＭＳ Ｐゴシック" pitchFamily="-65" charset="-128"/>
+              </a:rPr>
+              <a:t>Grid managers</a:t>
+            </a:r>
+          </a:p>
+          <a:p>
+            <a:pPr lvl="1">
+              <a:lnSpc>
+                <a:spcPct val="100000"/>
+              </a:lnSpc>
+              <a:spcBef>
+                <a:spcPct val="0"/>
+              </a:spcBef>
+              <a:buClrTx/>
+              <a:buSzTx/>
+            </a:pPr>
+            <a:r>
+              <a:rPr lang="en-US" sz="2000">
+                <a:latin typeface="Arial" pitchFamily="-65" charset="0"/>
+                <a:ea typeface="ＭＳ Ｐゴシック" pitchFamily="-65" charset="-128"/>
+              </a:rPr>
+              <a:t>Verify requirements are fulfilled by resource providers </a:t>
+            </a:r>
+          </a:p>
+          <a:p>
+            <a:pPr lvl="1">
+              <a:lnSpc>
+                <a:spcPct val="100000"/>
+              </a:lnSpc>
+              <a:spcBef>
+                <a:spcPct val="0"/>
+              </a:spcBef>
+              <a:spcAft>
+                <a:spcPct val="50000"/>
+              </a:spcAft>
+              <a:buClrTx/>
+              <a:buSzTx/>
+            </a:pPr>
+            <a:r>
+              <a:rPr lang="en-US" sz="2000">
+                <a:latin typeface="Arial" pitchFamily="-65" charset="0"/>
+                <a:ea typeface="ＭＳ Ｐゴシック" pitchFamily="-65" charset="-128"/>
+              </a:rPr>
+              <a:t>Identify failure trends</a:t>
+            </a:r>
+          </a:p>
+          <a:p>
+            <a:pPr>
+              <a:lnSpc>
+                <a:spcPct val="100000"/>
+              </a:lnSpc>
+              <a:spcBef>
+                <a:spcPct val="0"/>
+              </a:spcBef>
+              <a:buClrTx/>
+              <a:buSzTx/>
+            </a:pPr>
+            <a:r>
+              <a:rPr lang="en-US" sz="2400">
+                <a:latin typeface="Arial" pitchFamily="-65" charset="0"/>
+                <a:ea typeface="ＭＳ Ｐゴシック" pitchFamily="-65" charset="-128"/>
+              </a:rPr>
+              <a:t>System administrators</a:t>
+            </a:r>
+          </a:p>
+          <a:p>
+            <a:pPr lvl="1"/>
+            <a:r>
+              <a:rPr lang="en-US" sz="2000">
+                <a:latin typeface="Arial" pitchFamily="-65" charset="0"/>
+                <a:ea typeface="ＭＳ Ｐゴシック" pitchFamily="-65" charset="-128"/>
+              </a:rPr>
+              <a:t>Email notification</a:t>
+            </a:r>
+          </a:p>
+          <a:p>
+            <a:pPr lvl="1">
+              <a:spcAft>
+                <a:spcPct val="50000"/>
+              </a:spcAft>
+            </a:pPr>
+            <a:r>
+              <a:rPr lang="en-US" sz="2000">
+                <a:latin typeface="Arial" pitchFamily="-65" charset="0"/>
+                <a:ea typeface="ＭＳ Ｐゴシック" pitchFamily="-65" charset="-128"/>
+              </a:rPr>
+              <a:t>Debugging support</a:t>
+            </a:r>
+          </a:p>
+          <a:p>
+            <a:r>
+              <a:rPr lang="en-US" sz="2400">
+                <a:latin typeface="Arial" pitchFamily="-65" charset="0"/>
+                <a:ea typeface="ＭＳ Ｐゴシック" pitchFamily="-65" charset="-128"/>
+              </a:rPr>
+              <a:t>End users</a:t>
+            </a:r>
+          </a:p>
+          <a:p>
+            <a:pPr lvl="1"/>
+            <a:r>
+              <a:rPr lang="en-US" sz="2000">
+                <a:latin typeface="Arial" pitchFamily="-65" charset="0"/>
+                <a:ea typeface="ＭＳ Ｐゴシック" pitchFamily="-65" charset="-128"/>
+              </a:rPr>
+              <a:t>Higher availability</a:t>
+            </a:r>
+          </a:p>
+          <a:p>
+            <a:pPr lvl="1"/>
+            <a:r>
+              <a:rPr lang="en-US" sz="2000">
+                <a:latin typeface="Arial" pitchFamily="-65" charset="0"/>
+                <a:ea typeface="ＭＳ Ｐゴシック" pitchFamily="-65" charset="-128"/>
+              </a:rPr>
+              <a:t>Debug user account/environment issues</a:t>
+            </a:r>
+          </a:p>
+        </p:txBody>
+      </p:sp>
       <p:pic>
         <p:nvPicPr>
-          <p:cNvPr id="19463" name="Picture 5" descr="tglogo"/>
+          <p:cNvPr id="21509" name="Picture 20" descr="group_lg"/>
           <p:cNvPicPr>
             <a:picLocks noChangeAspect="1" noChangeArrowheads="1"/>
           </p:cNvPicPr>
           <p:nvPr/>
         </p:nvPicPr>
         <p:blipFill>
-          <a:blip r:embed="rId6"/>
+          <a:blip r:embed="rId3"/>
           <a:srcRect/>
           <a:stretch>
             <a:fillRect/>
@@ -6700,8 +6236,8 @@
         </p:blipFill>
         <p:spPr bwMode="auto">
           <a:xfrm>
-            <a:off x="3494088" y="4953000"/>
-            <a:ext cx="1001712" cy="1179513"/>
+            <a:off x="5105400" y="2063750"/>
+            <a:ext cx="3505200" cy="2508250"/>
           </a:xfrm>
           <a:prstGeom prst="rect">
             <a:avLst/>
@@ -6749,84 +6285,7 @@
       </p:grpSpPr>
       <p:sp>
         <p:nvSpPr>
-          <p:cNvPr id="21506" name="Rectangle 10"/>
-          <p:cNvSpPr>
-            <a:spLocks noChangeArrowheads="1"/>
-          </p:cNvSpPr>
-          <p:nvPr/>
-        </p:nvSpPr>
-        <p:spPr bwMode="auto">
-          <a:xfrm>
-            <a:off x="5562600" y="3232150"/>
-            <a:ext cx="1779588" cy="730250"/>
-          </a:xfrm>
-          <a:prstGeom prst="rect">
-            <a:avLst/>
-          </a:prstGeom>
-          <a:noFill/>
-          <a:ln w="9525">
-            <a:noFill/>
-            <a:miter lim="800000"/>
-            <a:headEnd/>
-            <a:tailEnd/>
-          </a:ln>
-        </p:spPr>
-        <p:txBody>
-          <a:bodyPr wrap="none">
-            <a:prstTxWarp prst="textNoShape">
-              <a:avLst/>
-            </a:prstTxWarp>
-            <a:spAutoFit/>
-          </a:bodyPr>
-          <a:lstStyle/>
-          <a:p>
-            <a:pPr algn="ctr">
-              <a:lnSpc>
-                <a:spcPct val="95000"/>
-              </a:lnSpc>
-              <a:spcBef>
-                <a:spcPct val="20000"/>
-              </a:spcBef>
-              <a:buClr>
-                <a:schemeClr val="tx1"/>
-              </a:buClr>
-              <a:buSzPct val="100000"/>
-            </a:pPr>
-            <a:r>
-              <a:rPr lang="en-US">
-                <a:latin typeface="Helvetica" pitchFamily="-65" charset="0"/>
-              </a:rPr>
-              <a:t>System</a:t>
-            </a:r>
-          </a:p>
-          <a:p>
-            <a:pPr algn="ctr">
-              <a:lnSpc>
-                <a:spcPct val="95000"/>
-              </a:lnSpc>
-              <a:spcBef>
-                <a:spcPct val="20000"/>
-              </a:spcBef>
-              <a:buClr>
-                <a:schemeClr val="tx1"/>
-              </a:buClr>
-              <a:buSzPct val="100000"/>
-            </a:pPr>
-            <a:r>
-              <a:rPr lang="en-US">
-                <a:latin typeface="Helvetica" pitchFamily="-65" charset="0"/>
-              </a:rPr>
-              <a:t>administrators</a:t>
-            </a:r>
-            <a:endParaRPr lang="en-US" sz="1800">
-              <a:latin typeface="Helvetica" pitchFamily="-65" charset="0"/>
-            </a:endParaRPr>
-          </a:p>
-        </p:txBody>
-      </p:sp>
-      <p:sp>
-        <p:nvSpPr>
-          <p:cNvPr id="21507" name="Rectangle 18"/>
+          <p:cNvPr id="23554" name="Rectangle 2"/>
           <p:cNvSpPr>
             <a:spLocks noGrp="1" noChangeArrowheads="1"/>
           </p:cNvSpPr>
@@ -6836,8 +6295,8 @@
         </p:nvSpPr>
         <p:spPr>
           <a:xfrm>
-            <a:off x="0" y="228600"/>
-            <a:ext cx="9144000" cy="1041400"/>
+            <a:off x="381000" y="228600"/>
+            <a:ext cx="8458200" cy="1041400"/>
           </a:xfrm>
         </p:spPr>
         <p:txBody>
@@ -6849,157 +6308,158 @@
                 <a:latin typeface="Arial" pitchFamily="-65" charset="0"/>
                 <a:ea typeface="ＭＳ Ｐゴシック" pitchFamily="-65" charset="-128"/>
               </a:rPr>
-              <a:t>Who benefits from grid monitoring?</a:t>
+              <a:t>Inca provides user-level grid monitoring</a:t>
             </a:r>
           </a:p>
         </p:txBody>
       </p:sp>
       <p:sp>
         <p:nvSpPr>
-          <p:cNvPr id="21508" name="Rectangle 19"/>
+          <p:cNvPr id="23555" name="Rectangle 3"/>
           <p:cNvSpPr>
             <a:spLocks noGrp="1" noChangeArrowheads="1"/>
           </p:cNvSpPr>
           <p:nvPr>
-            <p:ph type="body" idx="1"/>
+            <p:ph type="body" sz="half" idx="1"/>
           </p:nvPr>
         </p:nvSpPr>
         <p:spPr>
           <a:xfrm>
-            <a:off x="381000" y="1422400"/>
-            <a:ext cx="4419600" cy="4749800"/>
-          </a:xfrm>
+            <a:off x="152400" y="1300163"/>
+            <a:ext cx="3505200" cy="4567237"/>
+          </a:xfrm>
+          <a:noFill/>
         </p:spPr>
         <p:txBody>
-          <a:bodyPr/>
+          <a:bodyPr>
+            <a:spAutoFit/>
+          </a:bodyPr>
           <a:lstStyle/>
           <a:p>
-            <a:r>
-              <a:rPr lang="en-US" sz="2400">
-                <a:latin typeface="Arial" pitchFamily="-65" charset="0"/>
-                <a:ea typeface="ＭＳ Ｐゴシック" pitchFamily="-65" charset="-128"/>
-              </a:rPr>
-              <a:t>Grid managers</a:t>
-            </a:r>
-          </a:p>
-          <a:p>
-            <a:pPr lvl="1">
+            <a:pPr>
               <a:lnSpc>
-                <a:spcPct val="100000"/>
+                <a:spcPct val="85000"/>
               </a:lnSpc>
               <a:spcBef>
-                <a:spcPct val="0"/>
-              </a:spcBef>
-              <a:buClrTx/>
-              <a:buSzTx/>
-            </a:pPr>
-            <a:r>
-              <a:rPr lang="en-US" sz="2000">
-                <a:latin typeface="Arial" pitchFamily="-65" charset="0"/>
-                <a:ea typeface="ＭＳ Ｐゴシック" pitchFamily="-65" charset="-128"/>
-              </a:rPr>
-              <a:t>Verify requirements are fulfilled by resource providers </a:t>
-            </a:r>
-          </a:p>
-          <a:p>
-            <a:pPr lvl="1">
-              <a:lnSpc>
-                <a:spcPct val="100000"/>
-              </a:lnSpc>
-              <a:spcBef>
-                <a:spcPct val="0"/>
+                <a:spcPct val="10000"/>
               </a:spcBef>
               <a:spcAft>
                 <a:spcPct val="50000"/>
               </a:spcAft>
-              <a:buClrTx/>
-              <a:buSzTx/>
             </a:pPr>
             <a:r>
-              <a:rPr lang="en-US" sz="2000">
+              <a:rPr lang="en-US" sz="2200" smtClean="0">
                 <a:latin typeface="Arial" pitchFamily="-65" charset="0"/>
                 <a:ea typeface="ＭＳ Ｐゴシック" pitchFamily="-65" charset="-128"/>
               </a:rPr>
-              <a:t>Identify failure trends</a:t>
+              <a:t>Enables consistent user-level testing across resources</a:t>
             </a:r>
           </a:p>
           <a:p>
             <a:pPr>
               <a:lnSpc>
-                <a:spcPct val="100000"/>
+                <a:spcPct val="85000"/>
               </a:lnSpc>
               <a:spcBef>
-                <a:spcPct val="0"/>
+                <a:spcPct val="10000"/>
               </a:spcBef>
-              <a:buClrTx/>
-              <a:buSzTx/>
-            </a:pPr>
-            <a:r>
-              <a:rPr lang="en-US" sz="2400">
-                <a:latin typeface="Arial" pitchFamily="-65" charset="0"/>
-                <a:ea typeface="ＭＳ Ｐゴシック" pitchFamily="-65" charset="-128"/>
-              </a:rPr>
-              <a:t>System administrators</a:t>
-            </a:r>
-          </a:p>
-          <a:p>
-            <a:pPr lvl="1"/>
-            <a:r>
-              <a:rPr lang="en-US" sz="2000">
-                <a:latin typeface="Arial" pitchFamily="-65" charset="0"/>
-                <a:ea typeface="ＭＳ Ｐゴシック" pitchFamily="-65" charset="-128"/>
-              </a:rPr>
-              <a:t>Email notification</a:t>
-            </a:r>
-          </a:p>
-          <a:p>
-            <a:pPr lvl="1">
               <a:spcAft>
                 <a:spcPct val="50000"/>
               </a:spcAft>
             </a:pPr>
             <a:r>
-              <a:rPr lang="en-US" sz="2000">
+              <a:rPr lang="en-US" sz="2200" smtClean="0">
                 <a:latin typeface="Arial" pitchFamily="-65" charset="0"/>
                 <a:ea typeface="ＭＳ Ｐゴシック" pitchFamily="-65" charset="-128"/>
               </a:rPr>
-              <a:t>Debugging support</a:t>
-            </a:r>
-          </a:p>
-          <a:p>
-            <a:r>
-              <a:rPr lang="en-US" sz="2400">
+              <a:t>Easy to configure and maintain</a:t>
+            </a:r>
+          </a:p>
+          <a:p>
+            <a:pPr>
+              <a:lnSpc>
+                <a:spcPct val="85000"/>
+              </a:lnSpc>
+              <a:spcBef>
+                <a:spcPct val="10000"/>
+              </a:spcBef>
+              <a:spcAft>
+                <a:spcPct val="50000"/>
+              </a:spcAft>
+            </a:pPr>
+            <a:r>
+              <a:rPr lang="en-US" sz="2200" smtClean="0">
                 <a:latin typeface="Arial" pitchFamily="-65" charset="0"/>
                 <a:ea typeface="ＭＳ Ｐゴシック" pitchFamily="-65" charset="-128"/>
               </a:rPr>
-              <a:t>End users</a:t>
-            </a:r>
-          </a:p>
-          <a:p>
-            <a:pPr lvl="1"/>
-            <a:r>
-              <a:rPr lang="en-US" sz="2000">
+              <a:t>Easy to collect data from resource</a:t>
+            </a:r>
+          </a:p>
+          <a:p>
+            <a:pPr>
+              <a:lnSpc>
+                <a:spcPct val="85000"/>
+              </a:lnSpc>
+              <a:spcBef>
+                <a:spcPct val="10000"/>
+              </a:spcBef>
+              <a:spcAft>
+                <a:spcPct val="50000"/>
+              </a:spcAft>
+            </a:pPr>
+            <a:r>
+              <a:rPr lang="en-US" sz="2200" smtClean="0">
                 <a:latin typeface="Arial" pitchFamily="-65" charset="0"/>
                 <a:ea typeface="ＭＳ Ｐゴシック" pitchFamily="-65" charset="-128"/>
               </a:rPr>
-              <a:t>Higher availability</a:t>
-            </a:r>
-          </a:p>
-          <a:p>
-            <a:pPr lvl="1"/>
-            <a:r>
-              <a:rPr lang="en-US" sz="2000">
+              <a:t>Archived results support troubleshooting</a:t>
+            </a:r>
+          </a:p>
+          <a:p>
+            <a:pPr>
+              <a:lnSpc>
+                <a:spcPct val="85000"/>
+              </a:lnSpc>
+              <a:spcBef>
+                <a:spcPct val="10000"/>
+              </a:spcBef>
+              <a:spcAft>
+                <a:spcPct val="50000"/>
+              </a:spcAft>
+            </a:pPr>
+            <a:r>
+              <a:rPr lang="en-US" sz="2200" smtClean="0">
                 <a:latin typeface="Arial" pitchFamily="-65" charset="0"/>
                 <a:ea typeface="ＭＳ Ｐゴシック" pitchFamily="-65" charset="-128"/>
               </a:rPr>
-              <a:t>Debug user account/environment issues</a:t>
+              <a:t>Large variety of tests</a:t>
+            </a:r>
+          </a:p>
+          <a:p>
+            <a:pPr>
+              <a:lnSpc>
+                <a:spcPct val="85000"/>
+              </a:lnSpc>
+              <a:spcBef>
+                <a:spcPct val="10000"/>
+              </a:spcBef>
+              <a:spcAft>
+                <a:spcPct val="50000"/>
+              </a:spcAft>
+            </a:pPr>
+            <a:r>
+              <a:rPr lang="en-US" sz="2200" smtClean="0">
+                <a:latin typeface="Arial" pitchFamily="-65" charset="0"/>
+                <a:ea typeface="ＭＳ Ｐゴシック" pitchFamily="-65" charset="-128"/>
+              </a:rPr>
+              <a:t>Comprehensive views of data</a:t>
             </a:r>
           </a:p>
         </p:txBody>
       </p:sp>
       <p:pic>
         <p:nvPicPr>
-          <p:cNvPr id="21509" name="Picture 20" descr="group_lg"/>
+          <p:cNvPr id="23556" name="Picture 4" descr="archv"/>
           <p:cNvPicPr>
             <a:picLocks noChangeAspect="1" noChangeArrowheads="1"/>
           </p:cNvPicPr>
@@ -7014,8 +6474,8 @@
         </p:blipFill>
         <p:spPr bwMode="auto">
           <a:xfrm>
-            <a:off x="5105400" y="2063750"/>
-            <a:ext cx="3505200" cy="2508250"/>
+            <a:off x="3733800" y="1371600"/>
+            <a:ext cx="5029200" cy="4257675"/>
           </a:xfrm>
           <a:prstGeom prst="rect">
             <a:avLst/>
@@ -7063,7 +6523,7 @@
       </p:grpSpPr>
       <p:sp>
         <p:nvSpPr>
-          <p:cNvPr id="23554" name="Rectangle 2"/>
+          <p:cNvPr id="29698" name="Rectangle 2"/>
           <p:cNvSpPr>
             <a:spLocks noGrp="1" noChangeArrowheads="1"/>
           </p:cNvSpPr>
@@ -7073,7 +6533,7 @@
         </p:nvSpPr>
         <p:spPr>
           <a:xfrm>
-            <a:off x="381000" y="228600"/>
+            <a:off x="381000" y="304800"/>
             <a:ext cx="8458200" cy="1041400"/>
           </a:xfrm>
         </p:spPr>
@@ -7082,55 +6542,49 @@
           <a:lstStyle/>
           <a:p>
             <a:r>
-              <a:rPr lang="en-US" sz="3400">
+              <a:rPr lang="en-US" dirty="0">
                 <a:latin typeface="Arial" pitchFamily="-65" charset="0"/>
                 <a:ea typeface="ＭＳ Ｐゴシック" pitchFamily="-65" charset="-128"/>
               </a:rPr>
-              <a:t>Inca provides user-level grid monitoring</a:t>
+              <a:t>Reporters collect monitoring data</a:t>
             </a:r>
           </a:p>
         </p:txBody>
       </p:sp>
       <p:sp>
         <p:nvSpPr>
-          <p:cNvPr id="23555" name="Rectangle 3"/>
+          <p:cNvPr id="29699" name="Rectangle 3"/>
           <p:cNvSpPr>
             <a:spLocks noGrp="1" noChangeArrowheads="1"/>
           </p:cNvSpPr>
           <p:nvPr>
-            <p:ph type="body" sz="half" idx="1"/>
+            <p:ph type="body" idx="1"/>
           </p:nvPr>
         </p:nvSpPr>
         <p:spPr>
           <a:xfrm>
-            <a:off x="152400" y="1300163"/>
-            <a:ext cx="3505200" cy="4567237"/>
-          </a:xfrm>
-          <a:noFill/>
+            <a:off x="381000" y="1371600"/>
+            <a:ext cx="6270625" cy="4749800"/>
+          </a:xfrm>
         </p:spPr>
         <p:txBody>
-          <a:bodyPr>
-            <a:spAutoFit/>
-          </a:bodyPr>
+          <a:bodyPr/>
           <a:lstStyle/>
           <a:p>
             <a:pPr>
               <a:lnSpc>
                 <a:spcPct val="85000"/>
               </a:lnSpc>
-              <a:spcBef>
-                <a:spcPct val="10000"/>
-              </a:spcBef>
               <a:spcAft>
-                <a:spcPct val="50000"/>
+                <a:spcPct val="100000"/>
               </a:spcAft>
             </a:pPr>
             <a:r>
-              <a:rPr lang="en-US" sz="2200" smtClean="0">
+              <a:rPr lang="en-US" sz="2400">
                 <a:latin typeface="Arial" pitchFamily="-65" charset="0"/>
                 <a:ea typeface="ＭＳ Ｐゴシック" pitchFamily="-65" charset="-128"/>
               </a:rPr>
-              <a:t>Enables consistent user-level testing across resources</a:t>
+              <a:t>Executable programs that measure some aspect of the system or installed software</a:t>
             </a:r>
           </a:p>
           <a:p>
@@ -7138,19 +6592,16 @@
               <a:lnSpc>
                 <a:spcPct val="85000"/>
               </a:lnSpc>
-              <a:spcBef>
-                <a:spcPct val="10000"/>
-              </a:spcBef>
               <a:spcAft>
-                <a:spcPct val="50000"/>
+                <a:spcPct val="100000"/>
               </a:spcAft>
             </a:pPr>
             <a:r>
-              <a:rPr lang="en-US" sz="2200" smtClean="0">
+              <a:rPr lang="en-US" sz="2400">
                 <a:latin typeface="Arial" pitchFamily="-65" charset="0"/>
                 <a:ea typeface="ＭＳ Ｐゴシック" pitchFamily="-65" charset="-128"/>
               </a:rPr>
-              <a:t>Easy to configure and maintain</a:t>
+              <a:t>Supports a set of command-line options and writes XML to stdout</a:t>
             </a:r>
           </a:p>
           <a:p>
@@ -7158,39 +6609,40 @@
               <a:lnSpc>
                 <a:spcPct val="85000"/>
               </a:lnSpc>
-              <a:spcBef>
-                <a:spcPct val="10000"/>
-              </a:spcBef>
               <a:spcAft>
-                <a:spcPct val="50000"/>
+                <a:spcPct val="100000"/>
               </a:spcAft>
             </a:pPr>
             <a:r>
-              <a:rPr lang="en-US" sz="2200" smtClean="0">
+              <a:rPr lang="en-US" sz="2400">
+                <a:solidFill>
+                  <a:srgbClr val="000000"/>
+                </a:solidFill>
                 <a:latin typeface="Arial" pitchFamily="-65" charset="0"/>
                 <a:ea typeface="ＭＳ Ｐゴシック" pitchFamily="-65" charset="-128"/>
               </a:rPr>
-              <a:t>Easy to collect data from resource</a:t>
-            </a:r>
+              <a:t>Schema supports multiple types of data</a:t>
+            </a:r>
+            <a:endParaRPr lang="en-US" sz="2400">
+              <a:latin typeface="Arial" pitchFamily="-65" charset="0"/>
+              <a:ea typeface="ＭＳ Ｐゴシック" pitchFamily="-65" charset="-128"/>
+            </a:endParaRPr>
           </a:p>
           <a:p>
             <a:pPr>
               <a:lnSpc>
                 <a:spcPct val="85000"/>
               </a:lnSpc>
-              <a:spcBef>
-                <a:spcPct val="10000"/>
-              </a:spcBef>
               <a:spcAft>
-                <a:spcPct val="50000"/>
+                <a:spcPct val="100000"/>
               </a:spcAft>
             </a:pPr>
             <a:r>
-              <a:rPr lang="en-US" sz="2200" smtClean="0">
+              <a:rPr lang="en-US" sz="2400">
                 <a:latin typeface="Arial" pitchFamily="-65" charset="0"/>
                 <a:ea typeface="ＭＳ Ｐゴシック" pitchFamily="-65" charset="-128"/>
               </a:rPr>
-              <a:t>Archived results support troubleshooting</a:t>
+              <a:t>Extensive library support for perl and python  scripts (most reporters &lt; 30 lines of code)</a:t>
             </a:r>
           </a:p>
           <a:p>
@@ -7198,46 +6650,23 @@
               <a:lnSpc>
                 <a:spcPct val="85000"/>
               </a:lnSpc>
-              <a:spcBef>
-                <a:spcPct val="10000"/>
-              </a:spcBef>
               <a:spcAft>
-                <a:spcPct val="50000"/>
+                <a:spcPct val="100000"/>
               </a:spcAft>
             </a:pPr>
             <a:r>
-              <a:rPr lang="en-US" sz="2200" smtClean="0">
+              <a:rPr lang="en-US" sz="2400">
                 <a:latin typeface="Arial" pitchFamily="-65" charset="0"/>
                 <a:ea typeface="ＭＳ Ｐゴシック" pitchFamily="-65" charset="-128"/>
               </a:rPr>
-              <a:t>Large variety of tests</a:t>
-            </a:r>
-          </a:p>
-          <a:p>
-            <a:pPr>
-              <a:lnSpc>
-                <a:spcPct val="85000"/>
-              </a:lnSpc>
-              <a:spcBef>
-                <a:spcPct val="10000"/>
-              </a:spcBef>
-              <a:spcAft>
-                <a:spcPct val="50000"/>
-              </a:spcAft>
-            </a:pPr>
-            <a:r>
-              <a:rPr lang="en-US" sz="2200" smtClean="0">
-                <a:latin typeface="Arial" pitchFamily="-65" charset="0"/>
-                <a:ea typeface="ＭＳ Ｐゴシック" pitchFamily="-65" charset="-128"/>
-              </a:rPr>
-              <a:t>Comprehensive views of data</a:t>
+              <a:t>Independent of other Inca components</a:t>
             </a:r>
           </a:p>
         </p:txBody>
       </p:sp>
       <p:pic>
         <p:nvPicPr>
-          <p:cNvPr id="23556" name="Picture 4" descr="archv"/>
+          <p:cNvPr id="29700" name="Picture 4" descr="reporter"/>
           <p:cNvPicPr>
             <a:picLocks noChangeAspect="1" noChangeArrowheads="1"/>
           </p:cNvPicPr>
@@ -7252,8 +6681,8 @@
         </p:blipFill>
         <p:spPr bwMode="auto">
           <a:xfrm>
-            <a:off x="3733800" y="1371600"/>
-            <a:ext cx="5029200" cy="4257675"/>
+            <a:off x="6764338" y="1371600"/>
+            <a:ext cx="1998662" cy="4581525"/>
           </a:xfrm>
           <a:prstGeom prst="rect">
             <a:avLst/>
@@ -7283,213 +6712,6 @@
 </file>
 
 <file path=ppt/slides/slide6.xml><?xml version="1.0" encoding="utf-8"?>
-<p:sld xmlns:a="http://schemas.openxmlformats.org/drawingml/2006/main" xmlns:r="http://schemas.openxmlformats.org/officeDocument/2006/relationships" xmlns:mc="http://schemas.openxmlformats.org/markup-compatibility/2006" xmlns:mv="urn:schemas-microsoft-com:mac:vml" xmlns:p="http://schemas.openxmlformats.org/presentationml/2006/main" mc:Ignorable="mv" mc:PreserveAttributes="mv:*">
-  <p:cSld>
-    <p:spTree>
-      <p:nvGrpSpPr>
-        <p:cNvPr id="1" name=""/>
-        <p:cNvGrpSpPr/>
-        <p:nvPr/>
-      </p:nvGrpSpPr>
-      <p:grpSpPr>
-        <a:xfrm>
-          <a:off x="0" y="0"/>
-          <a:ext cx="0" cy="0"/>
-          <a:chOff x="0" y="0"/>
-          <a:chExt cx="0" cy="0"/>
-        </a:xfrm>
-      </p:grpSpPr>
-      <p:sp>
-        <p:nvSpPr>
-          <p:cNvPr id="29698" name="Rectangle 2"/>
-          <p:cNvSpPr>
-            <a:spLocks noGrp="1" noChangeArrowheads="1"/>
-          </p:cNvSpPr>
-          <p:nvPr>
-            <p:ph type="title"/>
-          </p:nvPr>
-        </p:nvSpPr>
-        <p:spPr>
-          <a:xfrm>
-            <a:off x="381000" y="304800"/>
-            <a:ext cx="8458200" cy="1041400"/>
-          </a:xfrm>
-        </p:spPr>
-        <p:txBody>
-          <a:bodyPr/>
-          <a:lstStyle/>
-          <a:p>
-            <a:r>
-              <a:rPr lang="en-US" dirty="0">
-                <a:latin typeface="Arial" pitchFamily="-65" charset="0"/>
-                <a:ea typeface="ＭＳ Ｐゴシック" pitchFamily="-65" charset="-128"/>
-              </a:rPr>
-              <a:t>Reporters collect monitoring data</a:t>
-            </a:r>
-          </a:p>
-        </p:txBody>
-      </p:sp>
-      <p:sp>
-        <p:nvSpPr>
-          <p:cNvPr id="29699" name="Rectangle 3"/>
-          <p:cNvSpPr>
-            <a:spLocks noGrp="1" noChangeArrowheads="1"/>
-          </p:cNvSpPr>
-          <p:nvPr>
-            <p:ph type="body" idx="1"/>
-          </p:nvPr>
-        </p:nvSpPr>
-        <p:spPr>
-          <a:xfrm>
-            <a:off x="381000" y="1371600"/>
-            <a:ext cx="6270625" cy="4749800"/>
-          </a:xfrm>
-        </p:spPr>
-        <p:txBody>
-          <a:bodyPr/>
-          <a:lstStyle/>
-          <a:p>
-            <a:pPr>
-              <a:lnSpc>
-                <a:spcPct val="85000"/>
-              </a:lnSpc>
-              <a:spcAft>
-                <a:spcPct val="100000"/>
-              </a:spcAft>
-            </a:pPr>
-            <a:r>
-              <a:rPr lang="en-US" sz="2400">
-                <a:latin typeface="Arial" pitchFamily="-65" charset="0"/>
-                <a:ea typeface="ＭＳ Ｐゴシック" pitchFamily="-65" charset="-128"/>
-              </a:rPr>
-              <a:t>Executable programs that measure some aspect of the system or installed software</a:t>
-            </a:r>
-          </a:p>
-          <a:p>
-            <a:pPr>
-              <a:lnSpc>
-                <a:spcPct val="85000"/>
-              </a:lnSpc>
-              <a:spcAft>
-                <a:spcPct val="100000"/>
-              </a:spcAft>
-            </a:pPr>
-            <a:r>
-              <a:rPr lang="en-US" sz="2400">
-                <a:latin typeface="Arial" pitchFamily="-65" charset="0"/>
-                <a:ea typeface="ＭＳ Ｐゴシック" pitchFamily="-65" charset="-128"/>
-              </a:rPr>
-              <a:t>Supports a set of command-line options and writes XML to stdout</a:t>
-            </a:r>
-          </a:p>
-          <a:p>
-            <a:pPr>
-              <a:lnSpc>
-                <a:spcPct val="85000"/>
-              </a:lnSpc>
-              <a:spcAft>
-                <a:spcPct val="100000"/>
-              </a:spcAft>
-            </a:pPr>
-            <a:r>
-              <a:rPr lang="en-US" sz="2400">
-                <a:solidFill>
-                  <a:srgbClr val="000000"/>
-                </a:solidFill>
-                <a:latin typeface="Arial" pitchFamily="-65" charset="0"/>
-                <a:ea typeface="ＭＳ Ｐゴシック" pitchFamily="-65" charset="-128"/>
-              </a:rPr>
-              <a:t>Schema supports multiple types of data</a:t>
-            </a:r>
-            <a:endParaRPr lang="en-US" sz="2400">
-              <a:latin typeface="Arial" pitchFamily="-65" charset="0"/>
-              <a:ea typeface="ＭＳ Ｐゴシック" pitchFamily="-65" charset="-128"/>
-            </a:endParaRPr>
-          </a:p>
-          <a:p>
-            <a:pPr>
-              <a:lnSpc>
-                <a:spcPct val="85000"/>
-              </a:lnSpc>
-              <a:spcAft>
-                <a:spcPct val="100000"/>
-              </a:spcAft>
-            </a:pPr>
-            <a:r>
-              <a:rPr lang="en-US" sz="2400">
-                <a:latin typeface="Arial" pitchFamily="-65" charset="0"/>
-                <a:ea typeface="ＭＳ Ｐゴシック" pitchFamily="-65" charset="-128"/>
-              </a:rPr>
-              <a:t>Extensive library support for perl and python  scripts (most reporters &lt; 30 lines of code)</a:t>
-            </a:r>
-          </a:p>
-          <a:p>
-            <a:pPr>
-              <a:lnSpc>
-                <a:spcPct val="85000"/>
-              </a:lnSpc>
-              <a:spcAft>
-                <a:spcPct val="100000"/>
-              </a:spcAft>
-            </a:pPr>
-            <a:r>
-              <a:rPr lang="en-US" sz="2400">
-                <a:latin typeface="Arial" pitchFamily="-65" charset="0"/>
-                <a:ea typeface="ＭＳ Ｐゴシック" pitchFamily="-65" charset="-128"/>
-              </a:rPr>
-              <a:t>Independent of other Inca components</a:t>
-            </a:r>
-          </a:p>
-        </p:txBody>
-      </p:sp>
-      <p:pic>
-        <p:nvPicPr>
-          <p:cNvPr id="29700" name="Picture 4" descr="reporter"/>
-          <p:cNvPicPr>
-            <a:picLocks noChangeAspect="1" noChangeArrowheads="1"/>
-          </p:cNvPicPr>
-          <p:nvPr/>
-        </p:nvPicPr>
-        <p:blipFill>
-          <a:blip r:embed="rId3"/>
-          <a:srcRect/>
-          <a:stretch>
-            <a:fillRect/>
-          </a:stretch>
-        </p:blipFill>
-        <p:spPr bwMode="auto">
-          <a:xfrm>
-            <a:off x="6764338" y="1371600"/>
-            <a:ext cx="1998662" cy="4581525"/>
-          </a:xfrm>
-          <a:prstGeom prst="rect">
-            <a:avLst/>
-          </a:prstGeom>
-          <a:noFill/>
-          <a:ln w="9525">
-            <a:noFill/>
-            <a:miter lim="800000"/>
-            <a:headEnd/>
-            <a:tailEnd/>
-          </a:ln>
-        </p:spPr>
-      </p:pic>
-    </p:spTree>
-  </p:cSld>
-  <p:clrMapOvr>
-    <a:masterClrMapping/>
-  </p:clrMapOvr>
-  <p:timing>
-    <p:tnLst>
-      <p:par>
-        <p:cTn id="1" dur="indefinite" restart="never" nodeType="tmRoot"/>
-      </p:par>
-    </p:tnLst>
-  </p:timing>
-</p:sld>
-</file>
-
-<file path=ppt/slides/slide7.xml><?xml version="1.0" encoding="utf-8"?>
 <p:sld xmlns:a="http://schemas.openxmlformats.org/drawingml/2006/main" xmlns:r="http://schemas.openxmlformats.org/officeDocument/2006/relationships" xmlns:mc="http://schemas.openxmlformats.org/markup-compatibility/2006" xmlns:mv="urn:schemas-microsoft-com:mac:vml" xmlns:p="http://schemas.openxmlformats.org/presentationml/2006/main" mc:Ignorable="mv" mc:PreserveAttributes="mv:*">
   <p:cSld>
     <p:spTree>
@@ -10059,6 +9281,398 @@
 </p:sld>
 </file>
 
+<file path=ppt/slides/slide7.xml><?xml version="1.0" encoding="utf-8"?>
+<p:sld xmlns:a="http://schemas.openxmlformats.org/drawingml/2006/main" xmlns:r="http://schemas.openxmlformats.org/officeDocument/2006/relationships" xmlns:mc="http://schemas.openxmlformats.org/markup-compatibility/2006" xmlns:mv="urn:schemas-microsoft-com:mac:vml" xmlns:p="http://schemas.openxmlformats.org/presentationml/2006/main" mc:Ignorable="mv" mc:PreserveAttributes="mv:*">
+  <p:cSld>
+    <p:spTree>
+      <p:nvGrpSpPr>
+        <p:cNvPr id="1" name=""/>
+        <p:cNvGrpSpPr/>
+        <p:nvPr/>
+      </p:nvGrpSpPr>
+      <p:grpSpPr>
+        <a:xfrm>
+          <a:off x="0" y="0"/>
+          <a:ext cx="0" cy="0"/>
+          <a:chOff x="0" y="0"/>
+          <a:chExt cx="0" cy="0"/>
+        </a:xfrm>
+      </p:grpSpPr>
+      <p:sp>
+        <p:nvSpPr>
+          <p:cNvPr id="44034" name="Rectangle 2"/>
+          <p:cNvSpPr>
+            <a:spLocks noGrp="1" noChangeArrowheads="1"/>
+          </p:cNvSpPr>
+          <p:nvPr>
+            <p:ph type="title"/>
+          </p:nvPr>
+        </p:nvSpPr>
+        <p:spPr>
+          <a:xfrm>
+            <a:off x="381000" y="228600"/>
+            <a:ext cx="8458200" cy="1041400"/>
+          </a:xfrm>
+        </p:spPr>
+        <p:txBody>
+          <a:bodyPr/>
+          <a:lstStyle/>
+          <a:p>
+            <a:r>
+              <a:rPr lang="en-US">
+                <a:latin typeface="Arial" pitchFamily="-65" charset="0"/>
+                <a:ea typeface="ＭＳ Ｐゴシック" pitchFamily="-65" charset="-128"/>
+              </a:rPr>
+              <a:t>Inca TeraGrid deployment</a:t>
+            </a:r>
+          </a:p>
+        </p:txBody>
+      </p:sp>
+      <p:sp>
+        <p:nvSpPr>
+          <p:cNvPr id="44035" name="Rectangle 3"/>
+          <p:cNvSpPr>
+            <a:spLocks noGrp="1" noChangeArrowheads="1"/>
+          </p:cNvSpPr>
+          <p:nvPr>
+            <p:ph type="body" idx="1"/>
+          </p:nvPr>
+        </p:nvSpPr>
+        <p:spPr>
+          <a:xfrm>
+            <a:off x="152400" y="1295400"/>
+            <a:ext cx="3429000" cy="4648200"/>
+          </a:xfrm>
+        </p:spPr>
+        <p:txBody>
+          <a:bodyPr/>
+          <a:lstStyle/>
+          <a:p>
+            <a:pPr>
+              <a:lnSpc>
+                <a:spcPct val="85000"/>
+              </a:lnSpc>
+              <a:spcAft>
+                <a:spcPct val="50000"/>
+              </a:spcAft>
+            </a:pPr>
+            <a:r>
+              <a:rPr lang="en-US" sz="2000" dirty="0">
+                <a:latin typeface="Arial" pitchFamily="-65" charset="0"/>
+                <a:ea typeface="ＭＳ Ｐゴシック" pitchFamily="-65" charset="-128"/>
+              </a:rPr>
+              <a:t>Running since 2003</a:t>
+            </a:r>
+          </a:p>
+          <a:p>
+            <a:pPr>
+              <a:lnSpc>
+                <a:spcPct val="85000"/>
+              </a:lnSpc>
+              <a:spcAft>
+                <a:spcPct val="50000"/>
+              </a:spcAft>
+            </a:pPr>
+            <a:r>
+              <a:rPr lang="en-US" sz="2000" dirty="0">
+                <a:latin typeface="Arial" pitchFamily="-65" charset="0"/>
+                <a:ea typeface="ＭＳ Ｐゴシック" pitchFamily="-65" charset="-128"/>
+              </a:rPr>
+              <a:t>Total </a:t>
+            </a:r>
+            <a:r>
+              <a:rPr lang="en-US" sz="2000">
+                <a:latin typeface="Arial" pitchFamily="-65" charset="0"/>
+                <a:ea typeface="ＭＳ Ｐゴシック" pitchFamily="-65" charset="-128"/>
+              </a:rPr>
+              <a:t>of</a:t>
+            </a:r>
+            <a:r>
+              <a:rPr lang="en-US" sz="2000" smtClean="0">
+                <a:latin typeface="Arial" pitchFamily="-65" charset="0"/>
+                <a:ea typeface="ＭＳ Ｐゴシック" pitchFamily="-65" charset="-128"/>
+              </a:rPr>
+              <a:t> ~2400 </a:t>
+            </a:r>
+            <a:r>
+              <a:rPr lang="en-US" sz="2000" dirty="0">
+                <a:latin typeface="Arial" pitchFamily="-65" charset="0"/>
+                <a:ea typeface="ＭＳ Ｐゴシック" pitchFamily="-65" charset="-128"/>
+              </a:rPr>
+              <a:t>tests running on 20 login nodes, 3 grid nodes, and 3 servers</a:t>
+            </a:r>
+          </a:p>
+          <a:p>
+            <a:pPr>
+              <a:lnSpc>
+                <a:spcPct val="85000"/>
+              </a:lnSpc>
+              <a:spcAft>
+                <a:spcPct val="50000"/>
+              </a:spcAft>
+            </a:pPr>
+            <a:r>
+              <a:rPr lang="en-US" sz="2000" dirty="0">
+                <a:latin typeface="Arial" pitchFamily="-65" charset="0"/>
+                <a:ea typeface="ＭＳ Ｐゴシック" pitchFamily="-65" charset="-128"/>
+              </a:rPr>
+              <a:t>Coordinated software and services</a:t>
+            </a:r>
+          </a:p>
+          <a:p>
+            <a:pPr>
+              <a:lnSpc>
+                <a:spcPct val="85000"/>
+              </a:lnSpc>
+              <a:spcAft>
+                <a:spcPct val="50000"/>
+              </a:spcAft>
+            </a:pPr>
+            <a:r>
+              <a:rPr lang="en-US" sz="2000" dirty="0">
+                <a:latin typeface="Arial" pitchFamily="-65" charset="0"/>
+                <a:ea typeface="ＭＳ Ｐゴシック" pitchFamily="-65" charset="-128"/>
+              </a:rPr>
+              <a:t>Cross-site tests</a:t>
+            </a:r>
+          </a:p>
+          <a:p>
+            <a:pPr>
+              <a:lnSpc>
+                <a:spcPct val="85000"/>
+              </a:lnSpc>
+              <a:spcAft>
+                <a:spcPct val="50000"/>
+              </a:spcAft>
+            </a:pPr>
+            <a:r>
+              <a:rPr lang="en-US" sz="2000" dirty="0">
+                <a:latin typeface="Arial" pitchFamily="-65" charset="0"/>
+                <a:ea typeface="ＭＳ Ｐゴシック" pitchFamily="-65" charset="-128"/>
+              </a:rPr>
+              <a:t>GRAM usage</a:t>
+            </a:r>
+          </a:p>
+          <a:p>
+            <a:pPr>
+              <a:lnSpc>
+                <a:spcPct val="85000"/>
+              </a:lnSpc>
+              <a:spcAft>
+                <a:spcPct val="50000"/>
+              </a:spcAft>
+            </a:pPr>
+            <a:r>
+              <a:rPr lang="en-US" sz="2000" dirty="0">
+                <a:latin typeface="Arial" pitchFamily="-65" charset="0"/>
+                <a:ea typeface="ＭＳ Ｐゴシック" pitchFamily="-65" charset="-128"/>
+              </a:rPr>
+              <a:t>CA certificate and CRL checking</a:t>
+            </a:r>
+          </a:p>
+          <a:p>
+            <a:pPr>
+              <a:lnSpc>
+                <a:spcPct val="85000"/>
+              </a:lnSpc>
+              <a:spcAft>
+                <a:spcPct val="50000"/>
+              </a:spcAft>
+            </a:pPr>
+            <a:r>
+              <a:rPr lang="en-US" sz="2000" dirty="0">
+                <a:latin typeface="Arial" pitchFamily="-65" charset="0"/>
+                <a:ea typeface="ＭＳ Ｐゴシック" pitchFamily="-65" charset="-128"/>
+              </a:rPr>
+              <a:t>Resource registration in information services</a:t>
+            </a:r>
+            <a:endParaRPr lang="en-US" sz="1600" dirty="0">
+              <a:latin typeface="Arial" pitchFamily="-65" charset="0"/>
+              <a:ea typeface="ＭＳ Ｐゴシック" pitchFamily="-65" charset="-128"/>
+            </a:endParaRPr>
+          </a:p>
+        </p:txBody>
+      </p:sp>
+      <p:sp>
+        <p:nvSpPr>
+          <p:cNvPr id="44036" name="Rectangle 4"/>
+          <p:cNvSpPr>
+            <a:spLocks noChangeArrowheads="1"/>
+          </p:cNvSpPr>
+          <p:nvPr/>
+        </p:nvSpPr>
+        <p:spPr bwMode="auto">
+          <a:xfrm>
+            <a:off x="5562600" y="5029200"/>
+            <a:ext cx="4419600" cy="152400"/>
+          </a:xfrm>
+          <a:prstGeom prst="rect">
+            <a:avLst/>
+          </a:prstGeom>
+          <a:solidFill>
+            <a:schemeClr val="folHlink">
+              <a:alpha val="25098"/>
+            </a:schemeClr>
+          </a:solidFill>
+          <a:ln w="9525">
+            <a:noFill/>
+            <a:miter lim="800000"/>
+            <a:headEnd/>
+            <a:tailEnd/>
+          </a:ln>
+        </p:spPr>
+        <p:txBody>
+          <a:bodyPr wrap="none" anchor="ctr">
+            <a:prstTxWarp prst="textNoShape">
+              <a:avLst/>
+            </a:prstTxWarp>
+          </a:bodyPr>
+          <a:lstStyle/>
+          <a:p>
+            <a:endParaRPr lang="en-US"/>
+          </a:p>
+        </p:txBody>
+      </p:sp>
+      <p:pic>
+        <p:nvPicPr>
+          <p:cNvPr id="44037" name="Picture 5" descr="tgPages"/>
+          <p:cNvPicPr>
+            <a:picLocks noChangeAspect="1" noChangeArrowheads="1"/>
+          </p:cNvPicPr>
+          <p:nvPr/>
+        </p:nvPicPr>
+        <p:blipFill>
+          <a:blip r:embed="rId3"/>
+          <a:srcRect/>
+          <a:stretch>
+            <a:fillRect/>
+          </a:stretch>
+        </p:blipFill>
+        <p:spPr bwMode="auto">
+          <a:xfrm>
+            <a:off x="3613150" y="1371600"/>
+            <a:ext cx="5378450" cy="3987800"/>
+          </a:xfrm>
+          <a:prstGeom prst="rect">
+            <a:avLst/>
+          </a:prstGeom>
+          <a:noFill/>
+          <a:ln w="9525">
+            <a:solidFill>
+              <a:schemeClr val="tx1"/>
+            </a:solidFill>
+            <a:miter lim="800000"/>
+            <a:headEnd/>
+            <a:tailEnd/>
+          </a:ln>
+        </p:spPr>
+      </p:pic>
+      <p:sp>
+        <p:nvSpPr>
+          <p:cNvPr id="44038" name="Text Box 6"/>
+          <p:cNvSpPr txBox="1">
+            <a:spLocks noChangeArrowheads="1"/>
+          </p:cNvSpPr>
+          <p:nvPr/>
+        </p:nvSpPr>
+        <p:spPr bwMode="auto">
+          <a:xfrm>
+            <a:off x="3429000" y="5424488"/>
+            <a:ext cx="4259263" cy="366712"/>
+          </a:xfrm>
+          <a:prstGeom prst="rect">
+            <a:avLst/>
+          </a:prstGeom>
+          <a:noFill/>
+          <a:ln w="9525">
+            <a:noFill/>
+            <a:miter lim="800000"/>
+            <a:headEnd/>
+            <a:tailEnd/>
+          </a:ln>
+        </p:spPr>
+        <p:txBody>
+          <a:bodyPr wrap="none">
+            <a:prstTxWarp prst="textNoShape">
+              <a:avLst/>
+            </a:prstTxWarp>
+            <a:spAutoFit/>
+          </a:bodyPr>
+          <a:lstStyle/>
+          <a:p>
+            <a:r>
+              <a:rPr lang="en-US" sz="1800">
+                <a:solidFill>
+                  <a:schemeClr val="accent2"/>
+                </a:solidFill>
+                <a:latin typeface="Times New Roman" pitchFamily="-65" charset="0"/>
+              </a:rPr>
+              <a:t>Screenshot of Inca status pages for TeraGrid</a:t>
+            </a:r>
+            <a:endParaRPr lang="en-US" sz="2400">
+              <a:latin typeface="Times New Roman" pitchFamily="-65" charset="0"/>
+            </a:endParaRPr>
+          </a:p>
+        </p:txBody>
+      </p:sp>
+      <p:sp>
+        <p:nvSpPr>
+          <p:cNvPr id="44039" name="Rectangle 7"/>
+          <p:cNvSpPr>
+            <a:spLocks noChangeArrowheads="1"/>
+          </p:cNvSpPr>
+          <p:nvPr/>
+        </p:nvSpPr>
+        <p:spPr bwMode="auto">
+          <a:xfrm>
+            <a:off x="4851400" y="5775325"/>
+            <a:ext cx="2540000" cy="396875"/>
+          </a:xfrm>
+          <a:prstGeom prst="rect">
+            <a:avLst/>
+          </a:prstGeom>
+          <a:noFill/>
+          <a:ln w="12700">
+            <a:noFill/>
+            <a:miter lim="800000"/>
+            <a:headEnd/>
+            <a:tailEnd/>
+          </a:ln>
+        </p:spPr>
+        <p:txBody>
+          <a:bodyPr wrap="none">
+            <a:prstTxWarp prst="textNoShape">
+              <a:avLst/>
+            </a:prstTxWarp>
+            <a:spAutoFit/>
+          </a:bodyPr>
+          <a:lstStyle/>
+          <a:p>
+            <a:pPr algn="ctr"/>
+            <a:r>
+              <a:rPr lang="en-US">
+                <a:latin typeface="Times New Roman" pitchFamily="-65" charset="0"/>
+              </a:rPr>
+              <a:t>http://inca.teragrid.org/</a:t>
+            </a:r>
+          </a:p>
+        </p:txBody>
+      </p:sp>
+    </p:spTree>
+  </p:cSld>
+  <p:clrMapOvr>
+    <a:masterClrMapping/>
+  </p:clrMapOvr>
+  <p:timing>
+    <p:tnLst>
+      <p:par>
+        <p:cTn id="1" dur="indefinite" restart="never" nodeType="tmRoot"/>
+      </p:par>
+    </p:tnLst>
+  </p:timing>
+</p:sld>
+</file>
+
 <file path=ppt/slides/slide8.xml><?xml version="1.0" encoding="utf-8"?>
 <p:sld xmlns:a="http://schemas.openxmlformats.org/drawingml/2006/main" xmlns:r="http://schemas.openxmlformats.org/officeDocument/2006/relationships" xmlns:mc="http://schemas.openxmlformats.org/markup-compatibility/2006" xmlns:mv="urn:schemas-microsoft-com:mac:vml" xmlns:p="http://schemas.openxmlformats.org/presentationml/2006/main" mc:Ignorable="mv" mc:PreserveAttributes="mv:*">
   <p:cSld>
@@ -10076,237 +9690,9 @@
           <a:chExt cx="0" cy="0"/>
         </a:xfrm>
       </p:grpSpPr>
-      <p:sp>
-        <p:nvSpPr>
-          <p:cNvPr id="44034" name="Rectangle 2"/>
-          <p:cNvSpPr>
-            <a:spLocks noGrp="1" noChangeArrowheads="1"/>
-          </p:cNvSpPr>
-          <p:nvPr>
-            <p:ph type="title"/>
-          </p:nvPr>
-        </p:nvSpPr>
-        <p:spPr>
-          <a:xfrm>
-            <a:off x="381000" y="228600"/>
-            <a:ext cx="8458200" cy="1041400"/>
-          </a:xfrm>
-        </p:spPr>
-        <p:txBody>
-          <a:bodyPr/>
-          <a:lstStyle/>
-          <a:p>
-            <a:r>
-              <a:rPr lang="en-US">
-                <a:latin typeface="Arial" pitchFamily="-65" charset="0"/>
-                <a:ea typeface="ＭＳ Ｐゴシック" pitchFamily="-65" charset="-128"/>
-              </a:rPr>
-              <a:t>Inca TeraGrid deployment</a:t>
-            </a:r>
-          </a:p>
-        </p:txBody>
-      </p:sp>
-      <p:sp>
-        <p:nvSpPr>
-          <p:cNvPr id="44035" name="Rectangle 3"/>
-          <p:cNvSpPr>
-            <a:spLocks noGrp="1" noChangeArrowheads="1"/>
-          </p:cNvSpPr>
-          <p:nvPr>
-            <p:ph type="body" idx="1"/>
-          </p:nvPr>
-        </p:nvSpPr>
-        <p:spPr>
-          <a:xfrm>
-            <a:off x="152400" y="1295400"/>
-            <a:ext cx="3429000" cy="4648200"/>
-          </a:xfrm>
-        </p:spPr>
-        <p:txBody>
-          <a:bodyPr/>
-          <a:lstStyle/>
-          <a:p>
-            <a:pPr>
-              <a:lnSpc>
-                <a:spcPct val="85000"/>
-              </a:lnSpc>
-              <a:spcAft>
-                <a:spcPct val="50000"/>
-              </a:spcAft>
-            </a:pPr>
-            <a:r>
-              <a:rPr lang="en-US" sz="2000" dirty="0">
-                <a:latin typeface="Arial" pitchFamily="-65" charset="0"/>
-                <a:ea typeface="ＭＳ Ｐゴシック" pitchFamily="-65" charset="-128"/>
-              </a:rPr>
-              <a:t>Running since 2003</a:t>
-            </a:r>
-          </a:p>
-          <a:p>
-            <a:pPr>
-              <a:lnSpc>
-                <a:spcPct val="85000"/>
-              </a:lnSpc>
-              <a:spcAft>
-                <a:spcPct val="50000"/>
-              </a:spcAft>
-            </a:pPr>
-            <a:r>
-              <a:rPr lang="en-US" sz="2000" dirty="0">
-                <a:latin typeface="Arial" pitchFamily="-65" charset="0"/>
-                <a:ea typeface="ＭＳ Ｐゴシック" pitchFamily="-65" charset="-128"/>
-              </a:rPr>
-              <a:t>Total of </a:t>
-            </a:r>
-            <a:r>
-              <a:rPr lang="en-US" sz="2000" dirty="0" smtClean="0">
-                <a:latin typeface="Arial" pitchFamily="-65" charset="0"/>
-                <a:ea typeface="ＭＳ Ｐゴシック" pitchFamily="-65" charset="-128"/>
-              </a:rPr>
-              <a:t>2 </a:t>
-            </a:r>
-            <a:r>
-              <a:rPr lang="en-US" sz="2000" dirty="0">
-                <a:latin typeface="Arial" pitchFamily="-65" charset="0"/>
-                <a:ea typeface="ＭＳ Ｐゴシック" pitchFamily="-65" charset="-128"/>
-              </a:rPr>
-              <a:t>tests running on 20 login nodes, 3 grid nodes, and 3 servers</a:t>
-            </a:r>
-          </a:p>
-          <a:p>
-            <a:pPr>
-              <a:lnSpc>
-                <a:spcPct val="85000"/>
-              </a:lnSpc>
-              <a:spcAft>
-                <a:spcPct val="50000"/>
-              </a:spcAft>
-            </a:pPr>
-            <a:r>
-              <a:rPr lang="en-US" sz="2000" dirty="0">
-                <a:latin typeface="Arial" pitchFamily="-65" charset="0"/>
-                <a:ea typeface="ＭＳ Ｐゴシック" pitchFamily="-65" charset="-128"/>
-              </a:rPr>
-              <a:t>Coordinated software and services</a:t>
-            </a:r>
-          </a:p>
-          <a:p>
-            <a:pPr>
-              <a:lnSpc>
-                <a:spcPct val="85000"/>
-              </a:lnSpc>
-              <a:spcAft>
-                <a:spcPct val="50000"/>
-              </a:spcAft>
-            </a:pPr>
-            <a:r>
-              <a:rPr lang="en-US" sz="2000" dirty="0">
-                <a:latin typeface="Arial" pitchFamily="-65" charset="0"/>
-                <a:ea typeface="ＭＳ Ｐゴシック" pitchFamily="-65" charset="-128"/>
-              </a:rPr>
-              <a:t>Cross-site tests</a:t>
-            </a:r>
-          </a:p>
-          <a:p>
-            <a:pPr>
-              <a:lnSpc>
-                <a:spcPct val="85000"/>
-              </a:lnSpc>
-              <a:spcAft>
-                <a:spcPct val="50000"/>
-              </a:spcAft>
-            </a:pPr>
-            <a:r>
-              <a:rPr lang="en-US" sz="2000" dirty="0">
-                <a:latin typeface="Arial" pitchFamily="-65" charset="0"/>
-                <a:ea typeface="ＭＳ Ｐゴシック" pitchFamily="-65" charset="-128"/>
-              </a:rPr>
-              <a:t>GRAM usage</a:t>
-            </a:r>
-          </a:p>
-          <a:p>
-            <a:pPr>
-              <a:lnSpc>
-                <a:spcPct val="85000"/>
-              </a:lnSpc>
-              <a:spcAft>
-                <a:spcPct val="50000"/>
-              </a:spcAft>
-            </a:pPr>
-            <a:r>
-              <a:rPr lang="en-US" sz="2000" dirty="0">
-                <a:latin typeface="Arial" pitchFamily="-65" charset="0"/>
-                <a:ea typeface="ＭＳ Ｐゴシック" pitchFamily="-65" charset="-128"/>
-              </a:rPr>
-              <a:t>CA certificate and CRL checking</a:t>
-            </a:r>
-          </a:p>
-          <a:p>
-            <a:pPr>
-              <a:lnSpc>
-                <a:spcPct val="85000"/>
-              </a:lnSpc>
-              <a:spcAft>
-                <a:spcPct val="50000"/>
-              </a:spcAft>
-            </a:pPr>
-            <a:r>
-              <a:rPr lang="en-US" sz="2000" dirty="0">
-                <a:latin typeface="Arial" pitchFamily="-65" charset="0"/>
-                <a:ea typeface="ＭＳ Ｐゴシック" pitchFamily="-65" charset="-128"/>
-              </a:rPr>
-              <a:t>Resource registration in information services</a:t>
-            </a:r>
-            <a:endParaRPr lang="en-US" sz="1600" dirty="0">
-              <a:latin typeface="Arial" pitchFamily="-65" charset="0"/>
-              <a:ea typeface="ＭＳ Ｐゴシック" pitchFamily="-65" charset="-128"/>
-            </a:endParaRPr>
-          </a:p>
-        </p:txBody>
-      </p:sp>
-      <p:sp>
-        <p:nvSpPr>
-          <p:cNvPr id="44036" name="Rectangle 4"/>
-          <p:cNvSpPr>
-            <a:spLocks noChangeArrowheads="1"/>
-          </p:cNvSpPr>
-          <p:nvPr/>
-        </p:nvSpPr>
-        <p:spPr bwMode="auto">
-          <a:xfrm>
-            <a:off x="5562600" y="5029200"/>
-            <a:ext cx="4419600" cy="152400"/>
-          </a:xfrm>
-          <a:prstGeom prst="rect">
-            <a:avLst/>
-          </a:prstGeom>
-          <a:solidFill>
-            <a:schemeClr val="folHlink">
-              <a:alpha val="25098"/>
-            </a:schemeClr>
-          </a:solidFill>
-          <a:ln w="9525">
-            <a:noFill/>
-            <a:miter lim="800000"/>
-            <a:headEnd/>
-            <a:tailEnd/>
-          </a:ln>
-        </p:spPr>
-        <p:txBody>
-          <a:bodyPr wrap="none" anchor="ctr">
-            <a:prstTxWarp prst="textNoShape">
-              <a:avLst/>
-            </a:prstTxWarp>
-          </a:bodyPr>
-          <a:lstStyle/>
-          <a:p>
-            <a:endParaRPr lang="en-US"/>
-          </a:p>
-        </p:txBody>
-      </p:sp>
       <p:pic>
         <p:nvPicPr>
-          <p:cNvPr id="44037" name="Picture 5" descr="tgPages"/>
+          <p:cNvPr id="59394" name="Picture 5" descr="ScreenSnapz"/>
           <p:cNvPicPr>
             <a:picLocks noChangeAspect="1" noChangeArrowheads="1"/>
           </p:cNvPicPr>
@@ -10321,35 +9707,8 @@
         </p:blipFill>
         <p:spPr bwMode="auto">
           <a:xfrm>
-            <a:off x="3613150" y="1371600"/>
-            <a:ext cx="5378450" cy="3987800"/>
-          </a:xfrm>
-          <a:prstGeom prst="rect">
-            <a:avLst/>
-          </a:prstGeom>
-          <a:noFill/>
-          <a:ln w="9525">
-            <a:solidFill>
-              <a:schemeClr val="tx1"/>
-            </a:solidFill>
-            <a:miter lim="800000"/>
-            <a:headEnd/>
-            <a:tailEnd/>
-          </a:ln>
-        </p:spPr>
-      </p:pic>
-      <p:sp>
-        <p:nvSpPr>
-          <p:cNvPr id="44038" name="Text Box 6"/>
-          <p:cNvSpPr txBox="1">
-            <a:spLocks noChangeArrowheads="1"/>
-          </p:cNvSpPr>
-          <p:nvPr/>
-        </p:nvSpPr>
-        <p:spPr bwMode="auto">
-          <a:xfrm>
-            <a:off x="3429000" y="5424488"/>
-            <a:ext cx="4259263" cy="366712"/>
+            <a:off x="4419600" y="1371600"/>
+            <a:ext cx="4292600" cy="4029075"/>
           </a:xfrm>
           <a:prstGeom prst="rect">
             <a:avLst/>
@@ -10362,6 +9721,177 @@
             <a:tailEnd/>
           </a:ln>
         </p:spPr>
+      </p:pic>
+      <p:sp>
+        <p:nvSpPr>
+          <p:cNvPr id="59395" name="Rectangle 2"/>
+          <p:cNvSpPr>
+            <a:spLocks noGrp="1" noChangeArrowheads="1"/>
+          </p:cNvSpPr>
+          <p:nvPr>
+            <p:ph type="title"/>
+          </p:nvPr>
+        </p:nvSpPr>
+        <p:spPr>
+          <a:xfrm>
+            <a:off x="381000" y="228600"/>
+            <a:ext cx="8458200" cy="1041400"/>
+          </a:xfrm>
+        </p:spPr>
+        <p:txBody>
+          <a:bodyPr/>
+          <a:lstStyle/>
+          <a:p>
+            <a:r>
+              <a:rPr lang="en-US"/>
+              <a:t>Inca GEON deployment</a:t>
+            </a:r>
+          </a:p>
+        </p:txBody>
+      </p:sp>
+      <p:sp>
+        <p:nvSpPr>
+          <p:cNvPr id="59396" name="Rectangle 3"/>
+          <p:cNvSpPr>
+            <a:spLocks noGrp="1" noChangeArrowheads="1"/>
+          </p:cNvSpPr>
+          <p:nvPr>
+            <p:ph type="body" idx="1"/>
+          </p:nvPr>
+        </p:nvSpPr>
+        <p:spPr>
+          <a:xfrm>
+            <a:off x="381000" y="1371600"/>
+            <a:ext cx="3505200" cy="4749800"/>
+          </a:xfrm>
+        </p:spPr>
+        <p:txBody>
+          <a:bodyPr/>
+          <a:lstStyle/>
+          <a:p>
+            <a:pPr>
+              <a:spcAft>
+                <a:spcPct val="100000"/>
+              </a:spcAft>
+            </a:pPr>
+            <a:r>
+              <a:rPr lang="en-US" sz="2000"/>
+              <a:t>Running since Feb 2008</a:t>
+            </a:r>
+          </a:p>
+          <a:p>
+            <a:pPr>
+              <a:spcAft>
+                <a:spcPct val="100000"/>
+              </a:spcAft>
+            </a:pPr>
+            <a:r>
+              <a:rPr lang="en-US" sz="2000"/>
+              <a:t>Total of 206 tests running on 5 login nodes and 6 servers </a:t>
+            </a:r>
+          </a:p>
+          <a:p>
+            <a:pPr>
+              <a:spcAft>
+                <a:spcPct val="100000"/>
+              </a:spcAft>
+            </a:pPr>
+            <a:r>
+              <a:rPr lang="en-US" sz="2000"/>
+              <a:t>LiDAR workflow services</a:t>
+            </a:r>
+          </a:p>
+          <a:p>
+            <a:pPr>
+              <a:spcAft>
+                <a:spcPct val="100000"/>
+              </a:spcAft>
+            </a:pPr>
+            <a:r>
+              <a:rPr lang="en-US" sz="2000"/>
+              <a:t>Web servers</a:t>
+            </a:r>
+          </a:p>
+          <a:p>
+            <a:pPr>
+              <a:spcAft>
+                <a:spcPct val="100000"/>
+              </a:spcAft>
+            </a:pPr>
+            <a:r>
+              <a:rPr lang="en-US" sz="2000"/>
+              <a:t>Ssh connectivity</a:t>
+            </a:r>
+          </a:p>
+          <a:p>
+            <a:pPr>
+              <a:spcAft>
+                <a:spcPct val="100000"/>
+              </a:spcAft>
+            </a:pPr>
+            <a:r>
+              <a:rPr lang="en-US" sz="2000"/>
+              <a:t>Base system information (Rocks, Gcc, Java, etc.)</a:t>
+            </a:r>
+          </a:p>
+        </p:txBody>
+      </p:sp>
+      <p:pic>
+        <p:nvPicPr>
+          <p:cNvPr id="59397" name="Picture 4" descr="logo_lofi"/>
+          <p:cNvPicPr>
+            <a:picLocks noChangeAspect="1" noChangeArrowheads="1"/>
+          </p:cNvPicPr>
+          <p:nvPr/>
+        </p:nvPicPr>
+        <p:blipFill>
+          <a:blip r:embed="rId4"/>
+          <a:srcRect/>
+          <a:stretch>
+            <a:fillRect/>
+          </a:stretch>
+        </p:blipFill>
+        <p:spPr bwMode="auto">
+          <a:xfrm>
+            <a:off x="4267200" y="4648200"/>
+            <a:ext cx="2352675" cy="909638"/>
+          </a:xfrm>
+          <a:prstGeom prst="rect">
+            <a:avLst/>
+          </a:prstGeom>
+          <a:noFill/>
+          <a:ln w="9525">
+            <a:noFill/>
+            <a:miter lim="800000"/>
+            <a:headEnd/>
+            <a:tailEnd/>
+          </a:ln>
+        </p:spPr>
+      </p:pic>
+      <p:sp>
+        <p:nvSpPr>
+          <p:cNvPr id="59398" name="Text Box 6"/>
+          <p:cNvSpPr txBox="1">
+            <a:spLocks noChangeArrowheads="1"/>
+          </p:cNvSpPr>
+          <p:nvPr/>
+        </p:nvSpPr>
+        <p:spPr bwMode="auto">
+          <a:xfrm>
+            <a:off x="4368800" y="5715000"/>
+            <a:ext cx="2724150" cy="396875"/>
+          </a:xfrm>
+          <a:prstGeom prst="rect">
+            <a:avLst/>
+          </a:prstGeom>
+          <a:noFill/>
+          <a:ln w="9525">
+            <a:noFill/>
+            <a:miter lim="800000"/>
+            <a:headEnd/>
+            <a:tailEnd/>
+          </a:ln>
+        </p:spPr>
         <p:txBody>
           <a:bodyPr wrap="none">
             <a:prstTxWarp prst="textNoShape">
@@ -10372,38 +9902,32 @@
           <a:lstStyle/>
           <a:p>
             <a:r>
-              <a:rPr lang="en-US" sz="1800">
-                <a:solidFill>
-                  <a:schemeClr val="accent2"/>
-                </a:solidFill>
+              <a:rPr lang="en-US">
                 <a:latin typeface="Times New Roman" pitchFamily="-65" charset="0"/>
               </a:rPr>
-              <a:t>Screenshot of Inca status pages for TeraGrid</a:t>
-            </a:r>
-            <a:endParaRPr lang="en-US" sz="2400">
-              <a:latin typeface="Times New Roman" pitchFamily="-65" charset="0"/>
-            </a:endParaRPr>
+              <a:t>http://inca-geon.sdsc.edu</a:t>
+            </a:r>
           </a:p>
         </p:txBody>
       </p:sp>
       <p:sp>
         <p:nvSpPr>
-          <p:cNvPr id="44039" name="Rectangle 7"/>
-          <p:cNvSpPr>
+          <p:cNvPr id="59399" name="Text Box 7"/>
+          <p:cNvSpPr txBox="1">
             <a:spLocks noChangeArrowheads="1"/>
           </p:cNvSpPr>
           <p:nvPr/>
         </p:nvSpPr>
         <p:spPr bwMode="auto">
           <a:xfrm>
-            <a:off x="4851400" y="5775325"/>
-            <a:ext cx="2540000" cy="396875"/>
+            <a:off x="4348163" y="5413375"/>
+            <a:ext cx="3929062" cy="366713"/>
           </a:xfrm>
           <a:prstGeom prst="rect">
             <a:avLst/>
           </a:prstGeom>
           <a:noFill/>
-          <a:ln w="12700">
+          <a:ln w="9525">
             <a:noFill/>
             <a:miter lim="800000"/>
             <a:headEnd/>
@@ -10419,13 +9943,18 @@
           </a:bodyPr>
           <a:lstStyle/>
           <a:p>
-            <a:pPr algn="ctr"/>
-            <a:r>
-              <a:rPr lang="en-US">
+            <a:r>
+              <a:rPr lang="en-US" sz="1800">
+                <a:solidFill>
+                  <a:schemeClr val="accent2"/>
+                </a:solidFill>
                 <a:latin typeface="Times New Roman" pitchFamily="-65" charset="0"/>
               </a:rPr>
-              <a:t>http://inca.teragrid.org/</a:t>
-            </a:r>
+              <a:t>Screenshot of Inca status map for GEON</a:t>
+            </a:r>
+            <a:endParaRPr lang="en-US" sz="2400">
+              <a:latin typeface="Times New Roman" pitchFamily="-65" charset="0"/>
+            </a:endParaRPr>
           </a:p>
         </p:txBody>
       </p:sp>
@@ -10461,274 +9990,266 @@
           <a:chExt cx="0" cy="0"/>
         </a:xfrm>
       </p:grpSpPr>
+      <p:sp>
+        <p:nvSpPr>
+          <p:cNvPr id="2" name="Title 1"/>
+          <p:cNvSpPr>
+            <a:spLocks noGrp="1"/>
+          </p:cNvSpPr>
+          <p:nvPr>
+            <p:ph type="title"/>
+          </p:nvPr>
+        </p:nvSpPr>
+        <p:spPr/>
+        <p:txBody>
+          <a:bodyPr/>
+          <a:lstStyle/>
+          <a:p>
+            <a:r>
+              <a:rPr lang="en-US" dirty="0" smtClean="0"/>
+              <a:t>Monitoring </a:t>
+            </a:r>
+            <a:r>
+              <a:rPr lang="en-US" dirty="0" err="1" smtClean="0"/>
+              <a:t>UCSD’s</a:t>
+            </a:r>
+            <a:r>
+              <a:rPr lang="en-US" dirty="0" smtClean="0"/>
+              <a:t> campus portal</a:t>
+            </a:r>
+            <a:endParaRPr lang="en-US" dirty="0"/>
+          </a:p>
+        </p:txBody>
+      </p:sp>
+      <p:sp>
+        <p:nvSpPr>
+          <p:cNvPr id="3" name="Content Placeholder 2"/>
+          <p:cNvSpPr>
+            <a:spLocks noGrp="1"/>
+          </p:cNvSpPr>
+          <p:nvPr>
+            <p:ph idx="1"/>
+          </p:nvPr>
+        </p:nvSpPr>
+        <p:spPr>
+          <a:xfrm>
+            <a:off x="228600" y="1422400"/>
+            <a:ext cx="8458200" cy="4749800"/>
+          </a:xfrm>
+        </p:spPr>
+        <p:txBody>
+          <a:bodyPr/>
+          <a:lstStyle/>
+          <a:p>
+            <a:r>
+              <a:rPr lang="en-US" dirty="0" smtClean="0"/>
+              <a:t>At first glance: (remote tests)</a:t>
+            </a:r>
+          </a:p>
+          <a:p>
+            <a:endParaRPr lang="en-US" dirty="0" smtClean="0"/>
+          </a:p>
+          <a:p>
+            <a:pPr lvl="1"/>
+            <a:r>
+              <a:rPr lang="en-US" dirty="0" smtClean="0"/>
+              <a:t>Tomcat/</a:t>
+            </a:r>
+            <a:r>
+              <a:rPr lang="en-US" dirty="0" err="1" smtClean="0"/>
+              <a:t>Gridsphere</a:t>
+            </a:r>
+            <a:endParaRPr lang="en-US" dirty="0" smtClean="0"/>
+          </a:p>
+          <a:p>
+            <a:pPr lvl="1"/>
+            <a:endParaRPr lang="en-US" dirty="0" smtClean="0"/>
+          </a:p>
+          <a:p>
+            <a:pPr lvl="1"/>
+            <a:r>
+              <a:rPr lang="en-US" dirty="0" err="1" smtClean="0"/>
+              <a:t>MyProxy</a:t>
+            </a:r>
+            <a:endParaRPr lang="en-US" dirty="0" smtClean="0"/>
+          </a:p>
+          <a:p>
+            <a:pPr lvl="1">
+              <a:buNone/>
+            </a:pPr>
+            <a:endParaRPr lang="en-US" dirty="0" smtClean="0"/>
+          </a:p>
+          <a:p>
+            <a:pPr lvl="1"/>
+            <a:r>
+              <a:rPr lang="en-US" dirty="0" smtClean="0"/>
+              <a:t>MDS</a:t>
+            </a:r>
+          </a:p>
+          <a:p>
+            <a:pPr lvl="1"/>
+            <a:endParaRPr lang="en-US" dirty="0" smtClean="0"/>
+          </a:p>
+          <a:p>
+            <a:pPr lvl="1"/>
+            <a:r>
+              <a:rPr lang="en-US" dirty="0" smtClean="0"/>
+              <a:t>WS-GRAM</a:t>
+            </a:r>
+          </a:p>
+          <a:p>
+            <a:pPr lvl="1">
+              <a:buNone/>
+            </a:pPr>
+            <a:endParaRPr lang="en-US" dirty="0"/>
+          </a:p>
+        </p:txBody>
+      </p:sp>
       <p:pic>
         <p:nvPicPr>
-          <p:cNvPr id="59394" name="Picture 5" descr="ScreenSnapz"/>
+          <p:cNvPr id="6" name="Picture 5" descr="ScreenSnapz.png"/>
           <p:cNvPicPr>
-            <a:picLocks noChangeAspect="1" noChangeArrowheads="1"/>
+            <a:picLocks noChangeAspect="1"/>
           </p:cNvPicPr>
           <p:nvPr/>
         </p:nvPicPr>
         <p:blipFill>
-          <a:blip r:embed="rId3"/>
-          <a:srcRect/>
+          <a:blip r:embed="rId2"/>
           <a:stretch>
             <a:fillRect/>
           </a:stretch>
         </p:blipFill>
-        <p:spPr bwMode="auto">
-          <a:xfrm>
-            <a:off x="4419600" y="1371600"/>
-            <a:ext cx="4292600" cy="4029075"/>
+        <p:spPr>
+          <a:xfrm>
+            <a:off x="5385232" y="1295400"/>
+            <a:ext cx="3225368" cy="4719472"/>
           </a:xfrm>
           <a:prstGeom prst="rect">
             <a:avLst/>
           </a:prstGeom>
-          <a:noFill/>
-          <a:ln w="9525">
-            <a:noFill/>
-            <a:miter lim="800000"/>
-            <a:headEnd/>
-            <a:tailEnd/>
+          <a:ln>
+            <a:solidFill>
+              <a:schemeClr val="tx1"/>
+            </a:solidFill>
           </a:ln>
         </p:spPr>
       </p:pic>
-      <p:sp>
-        <p:nvSpPr>
-          <p:cNvPr id="59395" name="Rectangle 2"/>
-          <p:cNvSpPr>
-            <a:spLocks noGrp="1" noChangeArrowheads="1"/>
-          </p:cNvSpPr>
-          <p:nvPr>
-            <p:ph type="title"/>
-          </p:nvPr>
-        </p:nvSpPr>
-        <p:spPr>
-          <a:xfrm>
-            <a:off x="381000" y="228600"/>
-            <a:ext cx="8458200" cy="1041400"/>
-          </a:xfrm>
-        </p:spPr>
-        <p:txBody>
-          <a:bodyPr/>
-          <a:lstStyle/>
-          <a:p>
-            <a:r>
-              <a:rPr lang="en-US"/>
-              <a:t>Inca GEON deployment</a:t>
-            </a:r>
-          </a:p>
-        </p:txBody>
-      </p:sp>
-      <p:sp>
-        <p:nvSpPr>
-          <p:cNvPr id="59396" name="Rectangle 3"/>
-          <p:cNvSpPr>
-            <a:spLocks noGrp="1" noChangeArrowheads="1"/>
-          </p:cNvSpPr>
-          <p:nvPr>
-            <p:ph type="body" idx="1"/>
-          </p:nvPr>
-        </p:nvSpPr>
-        <p:spPr>
-          <a:xfrm>
-            <a:off x="381000" y="1371600"/>
-            <a:ext cx="3505200" cy="4749800"/>
-          </a:xfrm>
-        </p:spPr>
-        <p:txBody>
-          <a:bodyPr/>
-          <a:lstStyle/>
-          <a:p>
-            <a:pPr>
-              <a:spcAft>
-                <a:spcPct val="100000"/>
-              </a:spcAft>
-            </a:pPr>
-            <a:r>
-              <a:rPr lang="en-US" sz="2000"/>
-              <a:t>Running since Feb 2008</a:t>
-            </a:r>
-          </a:p>
-          <a:p>
-            <a:pPr>
-              <a:spcAft>
-                <a:spcPct val="100000"/>
-              </a:spcAft>
-            </a:pPr>
-            <a:r>
-              <a:rPr lang="en-US" sz="2000"/>
-              <a:t>Total of 206 tests running on 5 login nodes and 6 servers </a:t>
-            </a:r>
-          </a:p>
-          <a:p>
-            <a:pPr>
-              <a:spcAft>
-                <a:spcPct val="100000"/>
-              </a:spcAft>
-            </a:pPr>
-            <a:r>
-              <a:rPr lang="en-US" sz="2000"/>
-              <a:t>LiDAR workflow services</a:t>
-            </a:r>
-          </a:p>
-          <a:p>
-            <a:pPr>
-              <a:spcAft>
-                <a:spcPct val="100000"/>
-              </a:spcAft>
-            </a:pPr>
-            <a:r>
-              <a:rPr lang="en-US" sz="2000"/>
-              <a:t>Web servers</a:t>
-            </a:r>
-          </a:p>
-          <a:p>
-            <a:pPr>
-              <a:spcAft>
-                <a:spcPct val="100000"/>
-              </a:spcAft>
-            </a:pPr>
-            <a:r>
-              <a:rPr lang="en-US" sz="2000"/>
-              <a:t>Ssh connectivity</a:t>
-            </a:r>
-          </a:p>
-          <a:p>
-            <a:pPr>
-              <a:spcAft>
-                <a:spcPct val="100000"/>
-              </a:spcAft>
-            </a:pPr>
-            <a:r>
-              <a:rPr lang="en-US" sz="2000"/>
-              <a:t>Base system information (Rocks, Gcc, Java, etc.)</a:t>
-            </a:r>
-          </a:p>
-        </p:txBody>
-      </p:sp>
-      <p:pic>
-        <p:nvPicPr>
-          <p:cNvPr id="59397" name="Picture 4" descr="logo_lofi"/>
-          <p:cNvPicPr>
-            <a:picLocks noChangeAspect="1" noChangeArrowheads="1"/>
-          </p:cNvPicPr>
+      <p:cxnSp>
+        <p:nvCxnSpPr>
+          <p:cNvPr id="8" name="Straight Arrow Connector 7"/>
+          <p:cNvCxnSpPr/>
           <p:nvPr/>
-        </p:nvPicPr>
-        <p:blipFill>
-          <a:blip r:embed="rId4"/>
-          <a:srcRect/>
-          <a:stretch>
-            <a:fillRect/>
-          </a:stretch>
-        </p:blipFill>
+        </p:nvCxnSpPr>
         <p:spPr bwMode="auto">
           <a:xfrm>
-            <a:off x="4267200" y="4648200"/>
-            <a:ext cx="2352675" cy="909638"/>
-          </a:xfrm>
-          <a:prstGeom prst="rect">
+            <a:off x="3962400" y="2667000"/>
+            <a:ext cx="1371600" cy="228600"/>
+          </a:xfrm>
+          <a:prstGeom prst="straightConnector1">
             <a:avLst/>
           </a:prstGeom>
-          <a:noFill/>
-          <a:ln w="9525">
-            <a:noFill/>
-            <a:miter lim="800000"/>
-            <a:headEnd/>
-            <a:tailEnd/>
+          <a:solidFill>
+            <a:schemeClr val="accent1"/>
+          </a:solidFill>
+          <a:ln w="9525" cap="flat" cmpd="sng" algn="ctr">
+            <a:solidFill>
+              <a:schemeClr val="tx1"/>
+            </a:solidFill>
+            <a:prstDash val="solid"/>
+            <a:round/>
+            <a:headEnd type="none" w="med" len="med"/>
+            <a:tailEnd type="arrow"/>
           </a:ln>
-        </p:spPr>
-      </p:pic>
-      <p:sp>
-        <p:nvSpPr>
-          <p:cNvPr id="59398" name="Text Box 6"/>
-          <p:cNvSpPr txBox="1">
-            <a:spLocks noChangeArrowheads="1"/>
-          </p:cNvSpPr>
+          <a:effectLst/>
+        </p:spPr>
+      </p:cxnSp>
+      <p:cxnSp>
+        <p:nvCxnSpPr>
+          <p:cNvPr id="9" name="Straight Arrow Connector 8"/>
+          <p:cNvCxnSpPr/>
           <p:nvPr/>
-        </p:nvSpPr>
+        </p:nvCxnSpPr>
         <p:spPr bwMode="auto">
-          <a:xfrm>
-            <a:off x="4368800" y="5715000"/>
-            <a:ext cx="2724150" cy="396875"/>
-          </a:xfrm>
-          <a:prstGeom prst="rect">
+          <a:xfrm flipV="1">
+            <a:off x="2438400" y="3276600"/>
+            <a:ext cx="2895600" cy="228600"/>
+          </a:xfrm>
+          <a:prstGeom prst="straightConnector1">
             <a:avLst/>
           </a:prstGeom>
-          <a:noFill/>
-          <a:ln w="9525">
-            <a:noFill/>
-            <a:miter lim="800000"/>
-            <a:headEnd/>
-            <a:tailEnd/>
+          <a:solidFill>
+            <a:schemeClr val="accent1"/>
+          </a:solidFill>
+          <a:ln w="9525" cap="flat" cmpd="sng" algn="ctr">
+            <a:solidFill>
+              <a:schemeClr val="tx1"/>
+            </a:solidFill>
+            <a:prstDash val="solid"/>
+            <a:round/>
+            <a:headEnd type="none" w="med" len="med"/>
+            <a:tailEnd type="arrow"/>
           </a:ln>
-        </p:spPr>
-        <p:txBody>
-          <a:bodyPr wrap="none">
-            <a:prstTxWarp prst="textNoShape">
-              <a:avLst/>
-            </a:prstTxWarp>
-            <a:spAutoFit/>
-          </a:bodyPr>
-          <a:lstStyle/>
-          <a:p>
-            <a:r>
-              <a:rPr lang="en-US">
-                <a:latin typeface="Times New Roman" pitchFamily="-65" charset="0"/>
-              </a:rPr>
-              <a:t>http://inca-geon.sdsc.edu</a:t>
-            </a:r>
-          </a:p>
-        </p:txBody>
-      </p:sp>
-      <p:sp>
-        <p:nvSpPr>
-          <p:cNvPr id="59399" name="Text Box 7"/>
-          <p:cNvSpPr txBox="1">
-            <a:spLocks noChangeArrowheads="1"/>
-          </p:cNvSpPr>
+          <a:effectLst/>
+        </p:spPr>
+      </p:cxnSp>
+      <p:cxnSp>
+        <p:nvCxnSpPr>
+          <p:cNvPr id="13" name="Straight Arrow Connector 12"/>
+          <p:cNvCxnSpPr/>
           <p:nvPr/>
-        </p:nvSpPr>
+        </p:nvCxnSpPr>
         <p:spPr bwMode="auto">
           <a:xfrm>
-            <a:off x="4348163" y="5413375"/>
-            <a:ext cx="3929062" cy="366713"/>
-          </a:xfrm>
-          <a:prstGeom prst="rect">
+            <a:off x="2819400" y="5257800"/>
+            <a:ext cx="2514600" cy="76200"/>
+          </a:xfrm>
+          <a:prstGeom prst="straightConnector1">
             <a:avLst/>
           </a:prstGeom>
-          <a:noFill/>
-          <a:ln w="9525">
-            <a:noFill/>
-            <a:miter lim="800000"/>
-            <a:headEnd/>
-            <a:tailEnd/>
+          <a:solidFill>
+            <a:schemeClr val="accent1"/>
+          </a:solidFill>
+          <a:ln w="9525" cap="flat" cmpd="sng" algn="ctr">
+            <a:solidFill>
+              <a:schemeClr val="tx1"/>
+            </a:solidFill>
+            <a:prstDash val="solid"/>
+            <a:round/>
+            <a:headEnd type="none" w="med" len="med"/>
+            <a:tailEnd type="arrow"/>
           </a:ln>
-        </p:spPr>
-        <p:txBody>
-          <a:bodyPr wrap="none">
-            <a:prstTxWarp prst="textNoShape">
-              <a:avLst/>
-            </a:prstTxWarp>
-            <a:spAutoFit/>
-          </a:bodyPr>
-          <a:lstStyle/>
-          <a:p>
-            <a:r>
-              <a:rPr lang="en-US" sz="1800">
-                <a:solidFill>
-                  <a:schemeClr val="accent2"/>
-                </a:solidFill>
-                <a:latin typeface="Times New Roman" pitchFamily="-65" charset="0"/>
-              </a:rPr>
-              <a:t>Screenshot of Inca status map for GEON</a:t>
-            </a:r>
-            <a:endParaRPr lang="en-US" sz="2400">
-              <a:latin typeface="Times New Roman" pitchFamily="-65" charset="0"/>
-            </a:endParaRPr>
-          </a:p>
-        </p:txBody>
-      </p:sp>
+          <a:effectLst/>
+        </p:spPr>
+      </p:cxnSp>
+      <p:cxnSp>
+        <p:nvCxnSpPr>
+          <p:cNvPr id="16" name="Straight Arrow Connector 15"/>
+          <p:cNvCxnSpPr/>
+          <p:nvPr/>
+        </p:nvCxnSpPr>
+        <p:spPr bwMode="auto">
+          <a:xfrm>
+            <a:off x="1981200" y="4343400"/>
+            <a:ext cx="3352800" cy="762000"/>
+          </a:xfrm>
+          <a:prstGeom prst="straightConnector1">
+            <a:avLst/>
+          </a:prstGeom>
+          <a:solidFill>
+            <a:schemeClr val="accent1"/>
+          </a:solidFill>
+          <a:ln w="9525" cap="flat" cmpd="sng" algn="ctr">
+            <a:solidFill>
+              <a:schemeClr val="tx1"/>
+            </a:solidFill>
+            <a:prstDash val="solid"/>
+            <a:round/>
+            <a:headEnd type="none" w="med" len="med"/>
+            <a:tailEnd type="arrow"/>
+          </a:ln>
+          <a:effectLst/>
+        </p:spPr>
+      </p:cxnSp>
     </p:spTree>
   </p:cSld>
   <p:clrMapOvr>

</xml_diff>